<commit_message>
Removed a bit of redundant code; cosmetic improvements; updated manual
</commit_message>
<xml_diff>
--- a/doc/tkmap_manual.pptx
+++ b/doc/tkmap_manual.pptx
@@ -1,20 +1,26 @@
 
 <file path=ppt/presentation.xml><?xml version="1.0" encoding="utf-8"?>
-<p:presentation xmlns:a="http://schemas.openxmlformats.org/drawingml/2006/main" xmlns:r="http://schemas.openxmlformats.org/officeDocument/2006/relationships" xmlns:p="http://schemas.openxmlformats.org/presentationml/2006/main" saveSubsetFonts="1">
+<p:presentation xmlns:a="http://schemas.openxmlformats.org/drawingml/2006/main" xmlns:r="http://schemas.openxmlformats.org/officeDocument/2006/relationships" xmlns:p="http://schemas.openxmlformats.org/presentationml/2006/main" showSpecialPlsOnTitleSld="0" saveSubsetFonts="1">
   <p:sldMasterIdLst>
     <p:sldMasterId id="2147483648" r:id="rId1"/>
   </p:sldMasterIdLst>
   <p:notesMasterIdLst>
-    <p:notesMasterId r:id="rId9"/>
+    <p:notesMasterId r:id="rId15"/>
   </p:notesMasterIdLst>
   <p:sldIdLst>
     <p:sldId id="257" r:id="rId2"/>
     <p:sldId id="258" r:id="rId3"/>
     <p:sldId id="259" r:id="rId4"/>
-    <p:sldId id="260" r:id="rId5"/>
-    <p:sldId id="261" r:id="rId6"/>
-    <p:sldId id="262" r:id="rId7"/>
-    <p:sldId id="263" r:id="rId8"/>
+    <p:sldId id="264" r:id="rId5"/>
+    <p:sldId id="265" r:id="rId6"/>
+    <p:sldId id="260" r:id="rId7"/>
+    <p:sldId id="266" r:id="rId8"/>
+    <p:sldId id="261" r:id="rId9"/>
+    <p:sldId id="267" r:id="rId10"/>
+    <p:sldId id="268" r:id="rId11"/>
+    <p:sldId id="269" r:id="rId12"/>
+    <p:sldId id="270" r:id="rId13"/>
+    <p:sldId id="263" r:id="rId14"/>
   </p:sldIdLst>
   <p:sldSz cx="12192000" cy="6858000"/>
   <p:notesSz cx="6858000" cy="9144000"/>
@@ -113,6 +119,11 @@
       </a:defRPr>
     </a:lvl9pPr>
   </p:defaultTextStyle>
+  <p:extLst>
+    <p:ext uri="{EFAFB233-063F-42B5-8137-9DF3F51BA10A}">
+      <p15:sldGuideLst xmlns:p15="http://schemas.microsoft.com/office/powerpoint/2012/main"/>
+    </p:ext>
+  </p:extLst>
 </p:presentation>
 </file>
 
@@ -198,7 +209,7 @@
           <a:p>
             <a:fld id="{24700429-BAA8-41ED-9533-5A8E557B96BB}" type="datetimeFigureOut">
               <a:rPr lang="en-GB" smtClean="0"/>
-              <a:t>28/06/2017</a:t>
+              <a:t>17/07/2017</a:t>
             </a:fld>
             <a:endParaRPr lang="en-GB"/>
           </a:p>
@@ -595,9 +606,9 @@
           <a:bodyPr/>
           <a:lstStyle/>
           <a:p>
-            <a:fld id="{1408CD08-9DF9-43AC-9196-905EBFC3654F}" type="datetime1">
-              <a:rPr lang="en-GB" smtClean="0"/>
-              <a:t>28/06/2017</a:t>
+            <a:fld id="{664C6515-DE4E-4440-815F-C18228E69121}" type="datetime1">
+              <a:rPr lang="en-GB" smtClean="0"/>
+              <a:t>17/07/2017</a:t>
             </a:fld>
             <a:endParaRPr lang="en-GB"/>
           </a:p>
@@ -769,9 +780,9 @@
           <a:bodyPr/>
           <a:lstStyle/>
           <a:p>
-            <a:fld id="{78C7B561-CF4E-4232-9387-FDEC6D5D7E8E}" type="datetime1">
-              <a:rPr lang="en-GB" smtClean="0"/>
-              <a:t>28/06/2017</a:t>
+            <a:fld id="{FD2991BD-04A1-4267-B4D7-E39E3FAD24FE}" type="datetime1">
+              <a:rPr lang="en-GB" smtClean="0"/>
+              <a:t>17/07/2017</a:t>
             </a:fld>
             <a:endParaRPr lang="en-GB"/>
           </a:p>
@@ -953,9 +964,9 @@
           <a:bodyPr/>
           <a:lstStyle/>
           <a:p>
-            <a:fld id="{307018FE-5101-4EFA-AD2D-5FB7F9AC15CE}" type="datetime1">
-              <a:rPr lang="en-GB" smtClean="0"/>
-              <a:t>28/06/2017</a:t>
+            <a:fld id="{D53067C1-1BF2-45E4-A043-01D021BC2E2C}" type="datetime1">
+              <a:rPr lang="en-GB" smtClean="0"/>
+              <a:t>17/07/2017</a:t>
             </a:fld>
             <a:endParaRPr lang="en-GB"/>
           </a:p>
@@ -1127,9 +1138,9 @@
           <a:bodyPr/>
           <a:lstStyle/>
           <a:p>
-            <a:fld id="{E3EE9096-45E0-46E8-9811-EF24E55C4CED}" type="datetime1">
-              <a:rPr lang="en-GB" smtClean="0"/>
-              <a:t>28/06/2017</a:t>
+            <a:fld id="{C02B2954-C6F9-497A-8798-9CCADDC45FD1}" type="datetime1">
+              <a:rPr lang="en-GB" smtClean="0"/>
+              <a:t>17/07/2017</a:t>
             </a:fld>
             <a:endParaRPr lang="en-GB"/>
           </a:p>
@@ -1377,9 +1388,9 @@
           <a:bodyPr/>
           <a:lstStyle/>
           <a:p>
-            <a:fld id="{EDE9F6E2-419A-4126-A83D-3D4520DE7849}" type="datetime1">
-              <a:rPr lang="en-GB" smtClean="0"/>
-              <a:t>28/06/2017</a:t>
+            <a:fld id="{A1711311-B7FD-48F0-8F55-D0355609D2B7}" type="datetime1">
+              <a:rPr lang="en-GB" smtClean="0"/>
+              <a:t>17/07/2017</a:t>
             </a:fld>
             <a:endParaRPr lang="en-GB"/>
           </a:p>
@@ -1613,9 +1624,9 @@
           <a:bodyPr/>
           <a:lstStyle/>
           <a:p>
-            <a:fld id="{E27E5547-C479-4409-838E-95B425DFC3F4}" type="datetime1">
-              <a:rPr lang="en-GB" smtClean="0"/>
-              <a:t>28/06/2017</a:t>
+            <a:fld id="{32B0CF09-AD03-4316-8C2B-BBAB6C8E8B24}" type="datetime1">
+              <a:rPr lang="en-GB" smtClean="0"/>
+              <a:t>17/07/2017</a:t>
             </a:fld>
             <a:endParaRPr lang="en-GB"/>
           </a:p>
@@ -1984,9 +1995,9 @@
           <a:bodyPr/>
           <a:lstStyle/>
           <a:p>
-            <a:fld id="{7001E31A-DC82-47C5-8C13-36167ADEF5DC}" type="datetime1">
-              <a:rPr lang="en-GB" smtClean="0"/>
-              <a:t>28/06/2017</a:t>
+            <a:fld id="{62C1F300-96F1-4845-94B9-274E0A630B7C}" type="datetime1">
+              <a:rPr lang="en-GB" smtClean="0"/>
+              <a:t>17/07/2017</a:t>
             </a:fld>
             <a:endParaRPr lang="en-GB"/>
           </a:p>
@@ -2106,9 +2117,9 @@
           <a:bodyPr/>
           <a:lstStyle/>
           <a:p>
-            <a:fld id="{27DB67AB-1FAB-4BB4-A0DF-F30B18F16A90}" type="datetime1">
-              <a:rPr lang="en-GB" smtClean="0"/>
-              <a:t>28/06/2017</a:t>
+            <a:fld id="{68257B03-CE89-4D16-9B22-D729AFBC1F49}" type="datetime1">
+              <a:rPr lang="en-GB" smtClean="0"/>
+              <a:t>17/07/2017</a:t>
             </a:fld>
             <a:endParaRPr lang="en-GB"/>
           </a:p>
@@ -2205,9 +2216,9 @@
           <a:bodyPr/>
           <a:lstStyle/>
           <a:p>
-            <a:fld id="{25743DBE-30EE-462B-9A83-5CCD2FE07058}" type="datetime1">
-              <a:rPr lang="en-GB" smtClean="0"/>
-              <a:t>28/06/2017</a:t>
+            <a:fld id="{4E3BD542-2018-4650-90A2-E3456B2E2AF1}" type="datetime1">
+              <a:rPr lang="en-GB" smtClean="0"/>
+              <a:t>17/07/2017</a:t>
             </a:fld>
             <a:endParaRPr lang="en-GB"/>
           </a:p>
@@ -2486,9 +2497,9 @@
           <a:bodyPr/>
           <a:lstStyle/>
           <a:p>
-            <a:fld id="{09A692C5-4367-4855-A43F-DAB781CF60AA}" type="datetime1">
-              <a:rPr lang="en-GB" smtClean="0"/>
-              <a:t>28/06/2017</a:t>
+            <a:fld id="{87A725B3-8047-4F42-AFD8-03C410D15BAB}" type="datetime1">
+              <a:rPr lang="en-GB" smtClean="0"/>
+              <a:t>17/07/2017</a:t>
             </a:fld>
             <a:endParaRPr lang="en-GB"/>
           </a:p>
@@ -2743,9 +2754,9 @@
           <a:bodyPr/>
           <a:lstStyle/>
           <a:p>
-            <a:fld id="{F197F54B-8A41-4248-8224-40AF58B4D006}" type="datetime1">
-              <a:rPr lang="en-GB" smtClean="0"/>
-              <a:t>28/06/2017</a:t>
+            <a:fld id="{A72DBA1A-9DBE-4E56-9BF5-951C930A2D8C}" type="datetime1">
+              <a:rPr lang="en-GB" smtClean="0"/>
+              <a:t>17/07/2017</a:t>
             </a:fld>
             <a:endParaRPr lang="en-GB"/>
           </a:p>
@@ -2960,9 +2971,9 @@
             </a:lvl1pPr>
           </a:lstStyle>
           <a:p>
-            <a:fld id="{5A6855D0-B899-482A-8D0A-6D1ABA21D99C}" type="datetime1">
-              <a:rPr lang="en-GB" smtClean="0"/>
-              <a:t>28/06/2017</a:t>
+            <a:fld id="{656CDA0C-48B7-4E67-8B2F-98E837E87DD5}" type="datetime1">
+              <a:rPr lang="en-GB" smtClean="0"/>
+              <a:t>17/07/2017</a:t>
             </a:fld>
             <a:endParaRPr lang="en-GB"/>
           </a:p>
@@ -3071,7 +3082,7 @@
     <p:sldLayoutId id="2147483658" r:id="rId10"/>
     <p:sldLayoutId id="2147483659" r:id="rId11"/>
   </p:sldLayoutIdLst>
-  <p:hf sldNum="0" hdr="0"/>
+  <p:hf hdr="0"/>
   <p:txStyles>
     <p:titleStyle>
       <a:lvl1pPr algn="l" defTabSz="914400" rtl="0" eaLnBrk="1" latinLnBrk="0" hangingPunct="1">
@@ -3372,170 +3383,101 @@
           <a:chExt cx="0" cy="0"/>
         </a:xfrm>
       </p:grpSpPr>
+      <p:sp>
+        <p:nvSpPr>
+          <p:cNvPr id="7" name="Date Placeholder 6"/>
+          <p:cNvSpPr>
+            <a:spLocks noGrp="1"/>
+          </p:cNvSpPr>
+          <p:nvPr>
+            <p:ph type="dt" sz="half" idx="10"/>
+          </p:nvPr>
+        </p:nvSpPr>
+        <p:spPr/>
+        <p:txBody>
+          <a:bodyPr/>
+          <a:lstStyle/>
+          <a:p>
+            <a:fld id="{A145A019-E5B4-498F-8F1C-65F2F9A32915}" type="datetime1">
+              <a:rPr lang="en-GB" smtClean="0"/>
+              <a:t>17/07/2017</a:t>
+            </a:fld>
+            <a:endParaRPr lang="en-GB"/>
+          </a:p>
+        </p:txBody>
+      </p:sp>
+      <p:sp>
+        <p:nvSpPr>
+          <p:cNvPr id="8" name="Footer Placeholder 7"/>
+          <p:cNvSpPr>
+            <a:spLocks noGrp="1"/>
+          </p:cNvSpPr>
+          <p:nvPr>
+            <p:ph type="ftr" sz="quarter" idx="11"/>
+          </p:nvPr>
+        </p:nvSpPr>
+        <p:spPr/>
+        <p:txBody>
+          <a:bodyPr/>
+          <a:lstStyle/>
+          <a:p>
+            <a:r>
+              <a:rPr lang="en-GB" smtClean="0"/>
+              <a:t>F. Ilic &amp; P. Jurgielewicz</a:t>
+            </a:r>
+            <a:endParaRPr lang="en-GB"/>
+          </a:p>
+        </p:txBody>
+      </p:sp>
       <p:pic>
         <p:nvPicPr>
-          <p:cNvPr id="4" name="Content Placeholder 3"/>
+          <p:cNvPr id="3" name="Picture 2"/>
           <p:cNvPicPr>
-            <a:picLocks noGrp="1" noChangeAspect="1"/>
+            <a:picLocks noChangeAspect="1"/>
           </p:cNvPicPr>
-          <p:nvPr>
-            <p:ph idx="4294967295"/>
-          </p:nvPr>
+          <p:nvPr/>
         </p:nvPicPr>
-        <p:blipFill rotWithShape="1">
-          <a:blip r:embed="rId2" cstate="print">
+        <p:blipFill>
+          <a:blip r:embed="rId2">
             <a:extLst>
               <a:ext uri="{28A0092B-C50C-407E-A947-70E740481C1C}">
                 <a14:useLocalDpi xmlns:a14="http://schemas.microsoft.com/office/drawing/2010/main" val="0"/>
               </a:ext>
             </a:extLst>
           </a:blip>
-          <a:srcRect r="1358"/>
-          <a:stretch/>
+          <a:stretch>
+            <a:fillRect/>
+          </a:stretch>
         </p:blipFill>
         <p:spPr>
           <a:xfrm>
-            <a:off x="648083" y="223660"/>
-            <a:ext cx="10755085" cy="6132690"/>
-          </a:xfrm>
-        </p:spPr>
-      </p:pic>
-      <p:sp>
-        <p:nvSpPr>
-          <p:cNvPr id="5" name="TextBox 4"/>
-          <p:cNvSpPr txBox="1"/>
-          <p:nvPr/>
-        </p:nvSpPr>
-        <p:spPr>
-          <a:xfrm>
-            <a:off x="4537166" y="1245326"/>
-            <a:ext cx="1158240" cy="369332"/>
+            <a:off x="0" y="12700"/>
+            <a:ext cx="12192000" cy="6832600"/>
           </a:xfrm>
           <a:prstGeom prst="rect">
             <a:avLst/>
           </a:prstGeom>
-          <a:noFill/>
         </p:spPr>
-        <p:txBody>
-          <a:bodyPr wrap="square" rtlCol="0">
-            <a:spAutoFit/>
-          </a:bodyPr>
-          <a:lstStyle/>
-          <a:p>
-            <a:r>
-              <a:rPr lang="pl-PL" dirty="0" smtClean="0">
-                <a:solidFill>
-                  <a:schemeClr val="bg2">
-                    <a:lumMod val="50000"/>
-                  </a:schemeClr>
-                </a:solidFill>
-              </a:rPr>
-              <a:t>A)</a:t>
-            </a:r>
-            <a:endParaRPr lang="en-GB" dirty="0">
-              <a:solidFill>
-                <a:schemeClr val="bg2">
-                  <a:lumMod val="50000"/>
-                </a:schemeClr>
-              </a:solidFill>
-            </a:endParaRPr>
-          </a:p>
-        </p:txBody>
-      </p:sp>
-      <p:sp>
-        <p:nvSpPr>
-          <p:cNvPr id="6" name="TextBox 5"/>
-          <p:cNvSpPr txBox="1"/>
-          <p:nvPr/>
-        </p:nvSpPr>
-        <p:spPr>
-          <a:xfrm>
-            <a:off x="9966961" y="1245326"/>
-            <a:ext cx="1158240" cy="369332"/>
-          </a:xfrm>
-          <a:prstGeom prst="rect">
-            <a:avLst/>
-          </a:prstGeom>
-          <a:noFill/>
-        </p:spPr>
-        <p:txBody>
-          <a:bodyPr wrap="square" rtlCol="0">
-            <a:spAutoFit/>
-          </a:bodyPr>
-          <a:lstStyle/>
-          <a:p>
-            <a:r>
-              <a:rPr lang="pl-PL" dirty="0">
-                <a:solidFill>
-                  <a:schemeClr val="bg2">
-                    <a:lumMod val="50000"/>
-                  </a:schemeClr>
-                </a:solidFill>
-              </a:rPr>
-              <a:t>B</a:t>
-            </a:r>
-            <a:r>
-              <a:rPr lang="pl-PL" dirty="0" smtClean="0">
-                <a:solidFill>
-                  <a:schemeClr val="bg2">
-                    <a:lumMod val="50000"/>
-                  </a:schemeClr>
-                </a:solidFill>
-              </a:rPr>
-              <a:t>)</a:t>
-            </a:r>
-            <a:endParaRPr lang="en-GB" dirty="0">
-              <a:solidFill>
-                <a:schemeClr val="bg2">
-                  <a:lumMod val="50000"/>
-                </a:schemeClr>
-              </a:solidFill>
-            </a:endParaRPr>
-          </a:p>
-        </p:txBody>
-      </p:sp>
-      <p:sp>
-        <p:nvSpPr>
-          <p:cNvPr id="7" name="Date Placeholder 6"/>
-          <p:cNvSpPr>
-            <a:spLocks noGrp="1"/>
-          </p:cNvSpPr>
-          <p:nvPr>
-            <p:ph type="dt" sz="half" idx="10"/>
-          </p:nvPr>
-        </p:nvSpPr>
-        <p:spPr/>
-        <p:txBody>
-          <a:bodyPr/>
-          <a:lstStyle/>
-          <a:p>
-            <a:fld id="{A81406AB-524A-428D-920F-F9C8ADFCDEFF}" type="datetime1">
-              <a:rPr lang="en-GB" smtClean="0"/>
-              <a:t>28/06/2017</a:t>
+      </p:pic>
+      <p:sp>
+        <p:nvSpPr>
+          <p:cNvPr id="9" name="Slide Number Placeholder 8"/>
+          <p:cNvSpPr>
+            <a:spLocks noGrp="1"/>
+          </p:cNvSpPr>
+          <p:nvPr>
+            <p:ph type="sldNum" sz="quarter" idx="12"/>
+          </p:nvPr>
+        </p:nvSpPr>
+        <p:spPr/>
+        <p:txBody>
+          <a:bodyPr/>
+          <a:lstStyle/>
+          <a:p>
+            <a:fld id="{3524DB9F-9467-4B90-B655-964C21D24326}" type="slidenum">
+              <a:rPr lang="en-GB" smtClean="0"/>
+              <a:t>1</a:t>
             </a:fld>
-            <a:endParaRPr lang="en-GB"/>
-          </a:p>
-        </p:txBody>
-      </p:sp>
-      <p:sp>
-        <p:nvSpPr>
-          <p:cNvPr id="8" name="Footer Placeholder 7"/>
-          <p:cNvSpPr>
-            <a:spLocks noGrp="1"/>
-          </p:cNvSpPr>
-          <p:nvPr>
-            <p:ph type="ftr" sz="quarter" idx="11"/>
-          </p:nvPr>
-        </p:nvSpPr>
-        <p:spPr/>
-        <p:txBody>
-          <a:bodyPr/>
-          <a:lstStyle/>
-          <a:p>
-            <a:r>
-              <a:rPr lang="en-GB" smtClean="0"/>
-              <a:t>F. Ilic &amp; P. Jurgielewicz</a:t>
-            </a:r>
             <a:endParaRPr lang="en-GB"/>
           </a:p>
         </p:txBody>
@@ -3550,6 +3492,1029 @@
   <p:clrMapOvr>
     <a:masterClrMapping/>
   </p:clrMapOvr>
+  <p:timing>
+    <p:tnLst>
+      <p:par>
+        <p:cTn id="1" dur="indefinite" restart="never" nodeType="tmRoot"/>
+      </p:par>
+    </p:tnLst>
+  </p:timing>
+</p:sld>
+</file>
+
+<file path=ppt/slides/slide10.xml><?xml version="1.0" encoding="utf-8"?>
+<p:sld xmlns:a="http://schemas.openxmlformats.org/drawingml/2006/main" xmlns:r="http://schemas.openxmlformats.org/officeDocument/2006/relationships" xmlns:p="http://schemas.openxmlformats.org/presentationml/2006/main">
+  <p:cSld>
+    <p:spTree>
+      <p:nvGrpSpPr>
+        <p:cNvPr id="1" name=""/>
+        <p:cNvGrpSpPr/>
+        <p:nvPr/>
+      </p:nvGrpSpPr>
+      <p:grpSpPr>
+        <a:xfrm>
+          <a:off x="0" y="0"/>
+          <a:ext cx="0" cy="0"/>
+          <a:chOff x="0" y="0"/>
+          <a:chExt cx="0" cy="0"/>
+        </a:xfrm>
+      </p:grpSpPr>
+      <p:sp>
+        <p:nvSpPr>
+          <p:cNvPr id="2" name="Title 1"/>
+          <p:cNvSpPr>
+            <a:spLocks noGrp="1"/>
+          </p:cNvSpPr>
+          <p:nvPr>
+            <p:ph type="title"/>
+          </p:nvPr>
+        </p:nvSpPr>
+        <p:spPr/>
+        <p:txBody>
+          <a:bodyPr/>
+          <a:lstStyle/>
+          <a:p>
+            <a:r>
+              <a:rPr lang="pl-PL" dirty="0"/>
+              <a:t>Section 4: </a:t>
+            </a:r>
+            <a:r>
+              <a:rPr lang="pl-PL" b="1" dirty="0">
+                <a:solidFill>
+                  <a:schemeClr val="accent6"/>
+                </a:solidFill>
+              </a:rPr>
+              <a:t>Data Show: </a:t>
+            </a:r>
+            <a:r>
+              <a:rPr lang="pl-PL" b="1" dirty="0" smtClean="0">
+                <a:solidFill>
+                  <a:schemeClr val="accent6"/>
+                </a:solidFill>
+              </a:rPr>
+              <a:t>Comparison contd</a:t>
+            </a:r>
+            <a:endParaRPr lang="en-GB" dirty="0"/>
+          </a:p>
+        </p:txBody>
+      </p:sp>
+      <p:pic>
+        <p:nvPicPr>
+          <p:cNvPr id="6" name="Content Placeholder 5"/>
+          <p:cNvPicPr>
+            <a:picLocks noGrp="1" noChangeAspect="1"/>
+          </p:cNvPicPr>
+          <p:nvPr>
+            <p:ph idx="1"/>
+          </p:nvPr>
+        </p:nvPicPr>
+        <p:blipFill>
+          <a:blip r:embed="rId2">
+            <a:extLst>
+              <a:ext uri="{28A0092B-C50C-407E-A947-70E740481C1C}">
+                <a14:useLocalDpi xmlns:a14="http://schemas.microsoft.com/office/drawing/2010/main" val="0"/>
+              </a:ext>
+            </a:extLst>
+          </a:blip>
+          <a:stretch>
+            <a:fillRect/>
+          </a:stretch>
+        </p:blipFill>
+        <p:spPr>
+          <a:xfrm>
+            <a:off x="838200" y="1397721"/>
+            <a:ext cx="10515600" cy="3131210"/>
+          </a:xfrm>
+        </p:spPr>
+      </p:pic>
+      <p:sp>
+        <p:nvSpPr>
+          <p:cNvPr id="4" name="Date Placeholder 3"/>
+          <p:cNvSpPr>
+            <a:spLocks noGrp="1"/>
+          </p:cNvSpPr>
+          <p:nvPr>
+            <p:ph type="dt" sz="half" idx="10"/>
+          </p:nvPr>
+        </p:nvSpPr>
+        <p:spPr/>
+        <p:txBody>
+          <a:bodyPr/>
+          <a:lstStyle/>
+          <a:p>
+            <a:fld id="{AEC949DE-A688-4A5D-B675-0E0818EB90A5}" type="datetime1">
+              <a:rPr lang="en-GB" smtClean="0"/>
+              <a:t>17/07/2017</a:t>
+            </a:fld>
+            <a:endParaRPr lang="en-GB"/>
+          </a:p>
+        </p:txBody>
+      </p:sp>
+      <p:sp>
+        <p:nvSpPr>
+          <p:cNvPr id="5" name="Footer Placeholder 4"/>
+          <p:cNvSpPr>
+            <a:spLocks noGrp="1"/>
+          </p:cNvSpPr>
+          <p:nvPr>
+            <p:ph type="ftr" sz="quarter" idx="11"/>
+          </p:nvPr>
+        </p:nvSpPr>
+        <p:spPr/>
+        <p:txBody>
+          <a:bodyPr/>
+          <a:lstStyle/>
+          <a:p>
+            <a:r>
+              <a:rPr lang="en-GB" smtClean="0"/>
+              <a:t>F. Ilic &amp; P. Jurgielewicz</a:t>
+            </a:r>
+            <a:endParaRPr lang="en-GB"/>
+          </a:p>
+        </p:txBody>
+      </p:sp>
+      <p:sp>
+        <p:nvSpPr>
+          <p:cNvPr id="7" name="TextBox 6"/>
+          <p:cNvSpPr txBox="1"/>
+          <p:nvPr/>
+        </p:nvSpPr>
+        <p:spPr>
+          <a:xfrm>
+            <a:off x="838200" y="4732638"/>
+            <a:ext cx="10515600" cy="923330"/>
+          </a:xfrm>
+          <a:prstGeom prst="rect">
+            <a:avLst/>
+          </a:prstGeom>
+          <a:noFill/>
+        </p:spPr>
+        <p:txBody>
+          <a:bodyPr wrap="square" rtlCol="0">
+            <a:spAutoFit/>
+          </a:bodyPr>
+          <a:lstStyle/>
+          <a:p>
+            <a:pPr marL="285750" indent="-285750">
+              <a:buFont typeface="Arial" panose="020B0604020202020204" pitchFamily="34" charset="0"/>
+              <a:buChar char="•"/>
+            </a:pPr>
+            <a:r>
+              <a:rPr lang="pl-PL" dirty="0" smtClean="0"/>
+              <a:t>Interactive Tracker Maps not only have synchronized pan&amp;zoom but also highlights</a:t>
+            </a:r>
+          </a:p>
+          <a:p>
+            <a:pPr marL="285750" indent="-285750">
+              <a:buFont typeface="Arial" panose="020B0604020202020204" pitchFamily="34" charset="0"/>
+              <a:buChar char="•"/>
+            </a:pPr>
+            <a:r>
+              <a:rPr lang="pl-PL" dirty="0" smtClean="0"/>
+              <a:t>However, these Maps do not have interactive elements in the </a:t>
+            </a:r>
+            <a:r>
+              <a:rPr lang="pl-PL" b="1" dirty="0" smtClean="0"/>
+              <a:t>Differece View </a:t>
+            </a:r>
+            <a:r>
+              <a:rPr lang="pl-PL" dirty="0" smtClean="0"/>
+              <a:t>(because of the performance concerns)</a:t>
+            </a:r>
+            <a:endParaRPr lang="en-GB" dirty="0"/>
+          </a:p>
+        </p:txBody>
+      </p:sp>
+      <p:sp>
+        <p:nvSpPr>
+          <p:cNvPr id="8" name="Slide Number Placeholder 7"/>
+          <p:cNvSpPr>
+            <a:spLocks noGrp="1"/>
+          </p:cNvSpPr>
+          <p:nvPr>
+            <p:ph type="sldNum" sz="quarter" idx="12"/>
+          </p:nvPr>
+        </p:nvSpPr>
+        <p:spPr/>
+        <p:txBody>
+          <a:bodyPr/>
+          <a:lstStyle/>
+          <a:p>
+            <a:fld id="{3524DB9F-9467-4B90-B655-964C21D24326}" type="slidenum">
+              <a:rPr lang="en-GB" smtClean="0"/>
+              <a:t>10</a:t>
+            </a:fld>
+            <a:endParaRPr lang="en-GB"/>
+          </a:p>
+        </p:txBody>
+      </p:sp>
+    </p:spTree>
+    <p:extLst>
+      <p:ext uri="{BB962C8B-B14F-4D97-AF65-F5344CB8AC3E}">
+        <p14:creationId xmlns:p14="http://schemas.microsoft.com/office/powerpoint/2010/main" val="924034033"/>
+      </p:ext>
+    </p:extLst>
+  </p:cSld>
+  <p:clrMapOvr>
+    <a:masterClrMapping/>
+  </p:clrMapOvr>
+  <p:timing>
+    <p:tnLst>
+      <p:par>
+        <p:cTn id="1" dur="indefinite" restart="never" nodeType="tmRoot"/>
+      </p:par>
+    </p:tnLst>
+  </p:timing>
+</p:sld>
+</file>
+
+<file path=ppt/slides/slide11.xml><?xml version="1.0" encoding="utf-8"?>
+<p:sld xmlns:a="http://schemas.openxmlformats.org/drawingml/2006/main" xmlns:r="http://schemas.openxmlformats.org/officeDocument/2006/relationships" xmlns:p="http://schemas.openxmlformats.org/presentationml/2006/main">
+  <p:cSld>
+    <p:spTree>
+      <p:nvGrpSpPr>
+        <p:cNvPr id="1" name=""/>
+        <p:cNvGrpSpPr/>
+        <p:nvPr/>
+      </p:nvGrpSpPr>
+      <p:grpSpPr>
+        <a:xfrm>
+          <a:off x="0" y="0"/>
+          <a:ext cx="0" cy="0"/>
+          <a:chOff x="0" y="0"/>
+          <a:chExt cx="0" cy="0"/>
+        </a:xfrm>
+      </p:grpSpPr>
+      <p:sp>
+        <p:nvSpPr>
+          <p:cNvPr id="2" name="Title 1"/>
+          <p:cNvSpPr>
+            <a:spLocks noGrp="1"/>
+          </p:cNvSpPr>
+          <p:nvPr>
+            <p:ph type="title"/>
+          </p:nvPr>
+        </p:nvSpPr>
+        <p:spPr/>
+        <p:txBody>
+          <a:bodyPr/>
+          <a:lstStyle/>
+          <a:p>
+            <a:r>
+              <a:rPr lang="pl-PL" dirty="0"/>
+              <a:t>Section </a:t>
+            </a:r>
+            <a:r>
+              <a:rPr lang="pl-PL" dirty="0" smtClean="0"/>
+              <a:t>4B: </a:t>
+            </a:r>
+            <a:r>
+              <a:rPr lang="pl-PL" b="1" dirty="0">
+                <a:solidFill>
+                  <a:schemeClr val="accent6"/>
+                </a:solidFill>
+              </a:rPr>
+              <a:t>Data Show</a:t>
+            </a:r>
+            <a:r>
+              <a:rPr lang="pl-PL" b="1" dirty="0" smtClean="0">
+                <a:solidFill>
+                  <a:schemeClr val="accent6"/>
+                </a:solidFill>
+              </a:rPr>
+              <a:t>: Timeline</a:t>
+            </a:r>
+            <a:endParaRPr lang="en-GB" dirty="0"/>
+          </a:p>
+        </p:txBody>
+      </p:sp>
+      <p:pic>
+        <p:nvPicPr>
+          <p:cNvPr id="7" name="Content Placeholder 6"/>
+          <p:cNvPicPr>
+            <a:picLocks noGrp="1" noChangeAspect="1"/>
+          </p:cNvPicPr>
+          <p:nvPr>
+            <p:ph idx="1"/>
+          </p:nvPr>
+        </p:nvPicPr>
+        <p:blipFill>
+          <a:blip r:embed="rId2">
+            <a:extLst>
+              <a:ext uri="{28A0092B-C50C-407E-A947-70E740481C1C}">
+                <a14:useLocalDpi xmlns:a14="http://schemas.microsoft.com/office/drawing/2010/main" val="0"/>
+              </a:ext>
+            </a:extLst>
+          </a:blip>
+          <a:stretch>
+            <a:fillRect/>
+          </a:stretch>
+        </p:blipFill>
+        <p:spPr>
+          <a:xfrm>
+            <a:off x="957776" y="1825625"/>
+            <a:ext cx="10276447" cy="4351338"/>
+          </a:xfrm>
+        </p:spPr>
+      </p:pic>
+      <p:sp>
+        <p:nvSpPr>
+          <p:cNvPr id="4" name="Date Placeholder 3"/>
+          <p:cNvSpPr>
+            <a:spLocks noGrp="1"/>
+          </p:cNvSpPr>
+          <p:nvPr>
+            <p:ph type="dt" sz="half" idx="10"/>
+          </p:nvPr>
+        </p:nvSpPr>
+        <p:spPr/>
+        <p:txBody>
+          <a:bodyPr/>
+          <a:lstStyle/>
+          <a:p>
+            <a:fld id="{C02B2954-C6F9-497A-8798-9CCADDC45FD1}" type="datetime1">
+              <a:rPr lang="en-GB" smtClean="0"/>
+              <a:t>17/07/2017</a:t>
+            </a:fld>
+            <a:endParaRPr lang="en-GB"/>
+          </a:p>
+        </p:txBody>
+      </p:sp>
+      <p:sp>
+        <p:nvSpPr>
+          <p:cNvPr id="5" name="Footer Placeholder 4"/>
+          <p:cNvSpPr>
+            <a:spLocks noGrp="1"/>
+          </p:cNvSpPr>
+          <p:nvPr>
+            <p:ph type="ftr" sz="quarter" idx="11"/>
+          </p:nvPr>
+        </p:nvSpPr>
+        <p:spPr/>
+        <p:txBody>
+          <a:bodyPr/>
+          <a:lstStyle/>
+          <a:p>
+            <a:r>
+              <a:rPr lang="en-GB" smtClean="0"/>
+              <a:t>F. Ilic &amp; P. Jurgielewicz</a:t>
+            </a:r>
+            <a:endParaRPr lang="en-GB"/>
+          </a:p>
+        </p:txBody>
+      </p:sp>
+      <p:sp>
+        <p:nvSpPr>
+          <p:cNvPr id="6" name="Slide Number Placeholder 5"/>
+          <p:cNvSpPr>
+            <a:spLocks noGrp="1"/>
+          </p:cNvSpPr>
+          <p:nvPr>
+            <p:ph type="sldNum" sz="quarter" idx="12"/>
+          </p:nvPr>
+        </p:nvSpPr>
+        <p:spPr/>
+        <p:txBody>
+          <a:bodyPr/>
+          <a:lstStyle/>
+          <a:p>
+            <a:fld id="{3524DB9F-9467-4B90-B655-964C21D24326}" type="slidenum">
+              <a:rPr lang="en-GB" smtClean="0"/>
+              <a:t>11</a:t>
+            </a:fld>
+            <a:endParaRPr lang="en-GB"/>
+          </a:p>
+        </p:txBody>
+      </p:sp>
+      <p:sp>
+        <p:nvSpPr>
+          <p:cNvPr id="8" name="Right Arrow 7"/>
+          <p:cNvSpPr/>
+          <p:nvPr/>
+        </p:nvSpPr>
+        <p:spPr>
+          <a:xfrm>
+            <a:off x="1977081" y="3466070"/>
+            <a:ext cx="586946" cy="345989"/>
+          </a:xfrm>
+          <a:prstGeom prst="rightArrow">
+            <a:avLst/>
+          </a:prstGeom>
+        </p:spPr>
+        <p:style>
+          <a:lnRef idx="2">
+            <a:schemeClr val="accent1">
+              <a:shade val="50000"/>
+            </a:schemeClr>
+          </a:lnRef>
+          <a:fillRef idx="1">
+            <a:schemeClr val="accent1"/>
+          </a:fillRef>
+          <a:effectRef idx="0">
+            <a:schemeClr val="accent1"/>
+          </a:effectRef>
+          <a:fontRef idx="minor">
+            <a:schemeClr val="lt1"/>
+          </a:fontRef>
+        </p:style>
+        <p:txBody>
+          <a:bodyPr rtlCol="0" anchor="ctr"/>
+          <a:lstStyle/>
+          <a:p>
+            <a:pPr algn="ctr"/>
+            <a:endParaRPr lang="en-GB"/>
+          </a:p>
+        </p:txBody>
+      </p:sp>
+      <p:sp>
+        <p:nvSpPr>
+          <p:cNvPr id="10" name="Right Arrow 9"/>
+          <p:cNvSpPr/>
+          <p:nvPr/>
+        </p:nvSpPr>
+        <p:spPr>
+          <a:xfrm rot="10800000">
+            <a:off x="9688727" y="5747673"/>
+            <a:ext cx="586946" cy="345989"/>
+          </a:xfrm>
+          <a:prstGeom prst="rightArrow">
+            <a:avLst/>
+          </a:prstGeom>
+        </p:spPr>
+        <p:style>
+          <a:lnRef idx="2">
+            <a:schemeClr val="accent1">
+              <a:shade val="50000"/>
+            </a:schemeClr>
+          </a:lnRef>
+          <a:fillRef idx="1">
+            <a:schemeClr val="accent1"/>
+          </a:fillRef>
+          <a:effectRef idx="0">
+            <a:schemeClr val="accent1"/>
+          </a:effectRef>
+          <a:fontRef idx="minor">
+            <a:schemeClr val="lt1"/>
+          </a:fontRef>
+        </p:style>
+        <p:txBody>
+          <a:bodyPr rtlCol="0" anchor="ctr"/>
+          <a:lstStyle/>
+          <a:p>
+            <a:pPr algn="ctr"/>
+            <a:endParaRPr lang="en-GB"/>
+          </a:p>
+        </p:txBody>
+      </p:sp>
+      <p:sp>
+        <p:nvSpPr>
+          <p:cNvPr id="11" name="TextBox 10"/>
+          <p:cNvSpPr txBox="1"/>
+          <p:nvPr/>
+        </p:nvSpPr>
+        <p:spPr>
+          <a:xfrm>
+            <a:off x="957776" y="3454398"/>
+            <a:ext cx="864973" cy="369332"/>
+          </a:xfrm>
+          <a:prstGeom prst="rect">
+            <a:avLst/>
+          </a:prstGeom>
+          <a:noFill/>
+        </p:spPr>
+        <p:txBody>
+          <a:bodyPr wrap="square" rtlCol="0">
+            <a:spAutoFit/>
+          </a:bodyPr>
+          <a:lstStyle/>
+          <a:p>
+            <a:r>
+              <a:rPr lang="pl-PL" dirty="0" smtClean="0"/>
+              <a:t>Slides</a:t>
+            </a:r>
+            <a:endParaRPr lang="en-GB" dirty="0"/>
+          </a:p>
+        </p:txBody>
+      </p:sp>
+      <p:sp>
+        <p:nvSpPr>
+          <p:cNvPr id="12" name="TextBox 11"/>
+          <p:cNvSpPr txBox="1"/>
+          <p:nvPr/>
+        </p:nvSpPr>
+        <p:spPr>
+          <a:xfrm>
+            <a:off x="10324071" y="5712659"/>
+            <a:ext cx="1575486" cy="369332"/>
+          </a:xfrm>
+          <a:prstGeom prst="rect">
+            <a:avLst/>
+          </a:prstGeom>
+          <a:noFill/>
+        </p:spPr>
+        <p:txBody>
+          <a:bodyPr wrap="square" rtlCol="0">
+            <a:spAutoFit/>
+          </a:bodyPr>
+          <a:lstStyle/>
+          <a:p>
+            <a:r>
+              <a:rPr lang="pl-PL" dirty="0" smtClean="0"/>
+              <a:t>Control Panel</a:t>
+            </a:r>
+            <a:endParaRPr lang="en-GB" dirty="0"/>
+          </a:p>
+        </p:txBody>
+      </p:sp>
+    </p:spTree>
+    <p:extLst>
+      <p:ext uri="{BB962C8B-B14F-4D97-AF65-F5344CB8AC3E}">
+        <p14:creationId xmlns:p14="http://schemas.microsoft.com/office/powerpoint/2010/main" val="1883165215"/>
+      </p:ext>
+    </p:extLst>
+  </p:cSld>
+  <p:clrMapOvr>
+    <a:masterClrMapping/>
+  </p:clrMapOvr>
+  <p:timing>
+    <p:tnLst>
+      <p:par>
+        <p:cTn id="1" dur="indefinite" restart="never" nodeType="tmRoot"/>
+      </p:par>
+    </p:tnLst>
+  </p:timing>
+</p:sld>
+</file>
+
+<file path=ppt/slides/slide12.xml><?xml version="1.0" encoding="utf-8"?>
+<p:sld xmlns:a="http://schemas.openxmlformats.org/drawingml/2006/main" xmlns:r="http://schemas.openxmlformats.org/officeDocument/2006/relationships" xmlns:p="http://schemas.openxmlformats.org/presentationml/2006/main">
+  <p:cSld>
+    <p:spTree>
+      <p:nvGrpSpPr>
+        <p:cNvPr id="1" name=""/>
+        <p:cNvGrpSpPr/>
+        <p:nvPr/>
+      </p:nvGrpSpPr>
+      <p:grpSpPr>
+        <a:xfrm>
+          <a:off x="0" y="0"/>
+          <a:ext cx="0" cy="0"/>
+          <a:chOff x="0" y="0"/>
+          <a:chExt cx="0" cy="0"/>
+        </a:xfrm>
+      </p:grpSpPr>
+      <p:sp>
+        <p:nvSpPr>
+          <p:cNvPr id="2" name="Title 1"/>
+          <p:cNvSpPr>
+            <a:spLocks noGrp="1"/>
+          </p:cNvSpPr>
+          <p:nvPr>
+            <p:ph type="title"/>
+          </p:nvPr>
+        </p:nvSpPr>
+        <p:spPr/>
+        <p:txBody>
+          <a:bodyPr/>
+          <a:lstStyle/>
+          <a:p>
+            <a:r>
+              <a:rPr lang="pl-PL" dirty="0"/>
+              <a:t>Section 4B: </a:t>
+            </a:r>
+            <a:r>
+              <a:rPr lang="pl-PL" b="1" dirty="0">
+                <a:solidFill>
+                  <a:schemeClr val="accent6"/>
+                </a:solidFill>
+              </a:rPr>
+              <a:t>Data Show: Timeline</a:t>
+            </a:r>
+            <a:endParaRPr lang="en-GB" dirty="0"/>
+          </a:p>
+        </p:txBody>
+      </p:sp>
+      <p:sp>
+        <p:nvSpPr>
+          <p:cNvPr id="3" name="Content Placeholder 2"/>
+          <p:cNvSpPr>
+            <a:spLocks noGrp="1"/>
+          </p:cNvSpPr>
+          <p:nvPr>
+            <p:ph idx="1"/>
+          </p:nvPr>
+        </p:nvSpPr>
+        <p:spPr/>
+        <p:txBody>
+          <a:bodyPr>
+            <a:normAutofit fontScale="92500" lnSpcReduction="10000"/>
+          </a:bodyPr>
+          <a:lstStyle/>
+          <a:p>
+            <a:r>
+              <a:rPr lang="pl-PL" dirty="0" smtClean="0"/>
+              <a:t>Timeline Control Panel (from left to right):</a:t>
+            </a:r>
+          </a:p>
+          <a:p>
+            <a:pPr lvl="1"/>
+            <a:r>
+              <a:rPr lang="pl-PL" dirty="0" smtClean="0"/>
+              <a:t>Play/Pause/Repeat button</a:t>
+            </a:r>
+          </a:p>
+          <a:p>
+            <a:pPr lvl="1"/>
+            <a:r>
+              <a:rPr lang="pl-PL" dirty="0" smtClean="0"/>
+              <a:t>Current slide number</a:t>
+            </a:r>
+          </a:p>
+          <a:p>
+            <a:pPr lvl="1"/>
+            <a:r>
+              <a:rPr lang="pl-PL" dirty="0" smtClean="0"/>
+              <a:t>Progress Bar – you can also drag it manually to adjust its position</a:t>
+            </a:r>
+          </a:p>
+          <a:p>
+            <a:pPr lvl="1"/>
+            <a:r>
+              <a:rPr lang="pl-PL" dirty="0" smtClean="0"/>
+              <a:t>Settings:</a:t>
+            </a:r>
+          </a:p>
+          <a:p>
+            <a:pPr lvl="2"/>
+            <a:r>
+              <a:rPr lang="pl-PL" dirty="0" smtClean="0"/>
+              <a:t>Enable playback looping</a:t>
+            </a:r>
+          </a:p>
+          <a:p>
+            <a:pPr lvl="2"/>
+            <a:r>
+              <a:rPr lang="pl-PL" dirty="0" smtClean="0"/>
+              <a:t>TkMPS: number of Tracker Maps that will be shown during 1s (min: 1, max: 25)</a:t>
+            </a:r>
+          </a:p>
+          <a:p>
+            <a:pPr lvl="1"/>
+            <a:r>
+              <a:rPr lang="pl-PL" dirty="0" smtClean="0"/>
+              <a:t>Download slideshow as gif</a:t>
+            </a:r>
+          </a:p>
+          <a:p>
+            <a:pPr lvl="2"/>
+            <a:r>
+              <a:rPr lang="pl-PL" dirty="0" smtClean="0"/>
+              <a:t>Resolution of the output file depends on the current size of Tracker Maps</a:t>
+            </a:r>
+          </a:p>
+          <a:p>
+            <a:pPr lvl="2"/>
+            <a:r>
+              <a:rPr lang="pl-PL" dirty="0" smtClean="0"/>
+              <a:t>Generation process might take a while</a:t>
+            </a:r>
+          </a:p>
+          <a:p>
+            <a:pPr lvl="1"/>
+            <a:r>
+              <a:rPr lang="pl-PL" dirty="0" smtClean="0"/>
+              <a:t>Toggle Fullscreen Mode</a:t>
+            </a:r>
+          </a:p>
+          <a:p>
+            <a:r>
+              <a:rPr lang="pl-PL" dirty="0" smtClean="0"/>
+              <a:t>Note: Timeline does not support pan&amp;zoom at this moment</a:t>
+            </a:r>
+            <a:endParaRPr lang="en-GB" dirty="0"/>
+          </a:p>
+        </p:txBody>
+      </p:sp>
+      <p:sp>
+        <p:nvSpPr>
+          <p:cNvPr id="4" name="Date Placeholder 3"/>
+          <p:cNvSpPr>
+            <a:spLocks noGrp="1"/>
+          </p:cNvSpPr>
+          <p:nvPr>
+            <p:ph type="dt" sz="half" idx="10"/>
+          </p:nvPr>
+        </p:nvSpPr>
+        <p:spPr/>
+        <p:txBody>
+          <a:bodyPr/>
+          <a:lstStyle/>
+          <a:p>
+            <a:fld id="{C02B2954-C6F9-497A-8798-9CCADDC45FD1}" type="datetime1">
+              <a:rPr lang="en-GB" smtClean="0"/>
+              <a:t>17/07/2017</a:t>
+            </a:fld>
+            <a:endParaRPr lang="en-GB"/>
+          </a:p>
+        </p:txBody>
+      </p:sp>
+      <p:sp>
+        <p:nvSpPr>
+          <p:cNvPr id="5" name="Footer Placeholder 4"/>
+          <p:cNvSpPr>
+            <a:spLocks noGrp="1"/>
+          </p:cNvSpPr>
+          <p:nvPr>
+            <p:ph type="ftr" sz="quarter" idx="11"/>
+          </p:nvPr>
+        </p:nvSpPr>
+        <p:spPr/>
+        <p:txBody>
+          <a:bodyPr/>
+          <a:lstStyle/>
+          <a:p>
+            <a:r>
+              <a:rPr lang="en-GB" smtClean="0"/>
+              <a:t>F. Ilic &amp; P. Jurgielewicz</a:t>
+            </a:r>
+            <a:endParaRPr lang="en-GB"/>
+          </a:p>
+        </p:txBody>
+      </p:sp>
+      <p:sp>
+        <p:nvSpPr>
+          <p:cNvPr id="6" name="Slide Number Placeholder 5"/>
+          <p:cNvSpPr>
+            <a:spLocks noGrp="1"/>
+          </p:cNvSpPr>
+          <p:nvPr>
+            <p:ph type="sldNum" sz="quarter" idx="12"/>
+          </p:nvPr>
+        </p:nvSpPr>
+        <p:spPr/>
+        <p:txBody>
+          <a:bodyPr/>
+          <a:lstStyle/>
+          <a:p>
+            <a:fld id="{3524DB9F-9467-4B90-B655-964C21D24326}" type="slidenum">
+              <a:rPr lang="en-GB" smtClean="0"/>
+              <a:t>12</a:t>
+            </a:fld>
+            <a:endParaRPr lang="en-GB"/>
+          </a:p>
+        </p:txBody>
+      </p:sp>
+    </p:spTree>
+    <p:extLst>
+      <p:ext uri="{BB962C8B-B14F-4D97-AF65-F5344CB8AC3E}">
+        <p14:creationId xmlns:p14="http://schemas.microsoft.com/office/powerpoint/2010/main" val="3307374479"/>
+      </p:ext>
+    </p:extLst>
+  </p:cSld>
+  <p:clrMapOvr>
+    <a:masterClrMapping/>
+  </p:clrMapOvr>
+  <p:timing>
+    <p:tnLst>
+      <p:par>
+        <p:cTn id="1" dur="indefinite" restart="never" nodeType="tmRoot"/>
+      </p:par>
+    </p:tnLst>
+  </p:timing>
+</p:sld>
+</file>
+
+<file path=ppt/slides/slide13.xml><?xml version="1.0" encoding="utf-8"?>
+<p:sld xmlns:a="http://schemas.openxmlformats.org/drawingml/2006/main" xmlns:r="http://schemas.openxmlformats.org/officeDocument/2006/relationships" xmlns:p="http://schemas.openxmlformats.org/presentationml/2006/main">
+  <p:cSld>
+    <p:spTree>
+      <p:nvGrpSpPr>
+        <p:cNvPr id="1" name=""/>
+        <p:cNvGrpSpPr/>
+        <p:nvPr/>
+      </p:nvGrpSpPr>
+      <p:grpSpPr>
+        <a:xfrm>
+          <a:off x="0" y="0"/>
+          <a:ext cx="0" cy="0"/>
+          <a:chOff x="0" y="0"/>
+          <a:chExt cx="0" cy="0"/>
+        </a:xfrm>
+      </p:grpSpPr>
+      <p:sp>
+        <p:nvSpPr>
+          <p:cNvPr id="2" name="Title 1"/>
+          <p:cNvSpPr>
+            <a:spLocks noGrp="1"/>
+          </p:cNvSpPr>
+          <p:nvPr>
+            <p:ph type="title"/>
+          </p:nvPr>
+        </p:nvSpPr>
+        <p:spPr/>
+        <p:txBody>
+          <a:bodyPr/>
+          <a:lstStyle/>
+          <a:p>
+            <a:r>
+              <a:rPr lang="pl-PL" dirty="0" smtClean="0"/>
+              <a:t>Known issues</a:t>
+            </a:r>
+            <a:endParaRPr lang="en-GB" dirty="0"/>
+          </a:p>
+        </p:txBody>
+      </p:sp>
+      <p:sp>
+        <p:nvSpPr>
+          <p:cNvPr id="3" name="Content Placeholder 2"/>
+          <p:cNvSpPr>
+            <a:spLocks noGrp="1"/>
+          </p:cNvSpPr>
+          <p:nvPr>
+            <p:ph idx="1"/>
+          </p:nvPr>
+        </p:nvSpPr>
+        <p:spPr/>
+        <p:txBody>
+          <a:bodyPr>
+            <a:normAutofit fontScale="92500" lnSpcReduction="10000"/>
+          </a:bodyPr>
+          <a:lstStyle/>
+          <a:p>
+            <a:r>
+              <a:rPr lang="pl-PL" dirty="0" smtClean="0"/>
+              <a:t>Browsers supported:</a:t>
+            </a:r>
+          </a:p>
+          <a:p>
+            <a:pPr lvl="1"/>
+            <a:r>
+              <a:rPr lang="pl-PL" dirty="0" smtClean="0"/>
+              <a:t>Chrome</a:t>
+            </a:r>
+          </a:p>
+          <a:p>
+            <a:pPr lvl="1"/>
+            <a:r>
+              <a:rPr lang="pl-PL" dirty="0" smtClean="0"/>
+              <a:t>Firefox</a:t>
+            </a:r>
+          </a:p>
+          <a:p>
+            <a:pPr lvl="1"/>
+            <a:r>
+              <a:rPr lang="pl-PL" dirty="0" smtClean="0"/>
+              <a:t>Safari</a:t>
+            </a:r>
+          </a:p>
+          <a:p>
+            <a:r>
+              <a:rPr lang="pl-PL" dirty="0" smtClean="0"/>
+              <a:t>Browsers </a:t>
+            </a:r>
+            <a:r>
+              <a:rPr lang="pl-PL" b="1" dirty="0" smtClean="0"/>
+              <a:t>NOT</a:t>
+            </a:r>
+            <a:r>
+              <a:rPr lang="pl-PL" dirty="0" smtClean="0"/>
+              <a:t> supported at all:</a:t>
+            </a:r>
+          </a:p>
+          <a:p>
+            <a:pPr lvl="1"/>
+            <a:r>
+              <a:rPr lang="pl-PL" dirty="0" smtClean="0"/>
+              <a:t>IE / </a:t>
+            </a:r>
+            <a:r>
+              <a:rPr lang="pl-PL" dirty="0" smtClean="0"/>
+              <a:t>Edge</a:t>
+            </a:r>
+          </a:p>
+          <a:p>
+            <a:r>
+              <a:rPr lang="pl-PL" dirty="0" smtClean="0"/>
+              <a:t>Interactive Maps:</a:t>
+            </a:r>
+          </a:p>
+          <a:p>
+            <a:pPr lvl="1"/>
+            <a:r>
+              <a:rPr lang="pl-PL" dirty="0" smtClean="0"/>
+              <a:t>In certain situations interactive areas are not being scaled properly; if this problem occurs solution can </a:t>
+            </a:r>
+            <a:r>
+              <a:rPr lang="pl-PL" smtClean="0"/>
+              <a:t>be to click </a:t>
+            </a:r>
+            <a:r>
+              <a:rPr lang="pl-PL" dirty="0" smtClean="0"/>
+              <a:t>once again on the active tab</a:t>
+            </a:r>
+          </a:p>
+          <a:p>
+            <a:r>
+              <a:rPr lang="pl-PL" dirty="0" smtClean="0"/>
+              <a:t>Timeline:</a:t>
+            </a:r>
+          </a:p>
+          <a:p>
+            <a:pPr lvl="1"/>
+            <a:r>
+              <a:rPr lang="pl-PL" dirty="0" smtClean="0"/>
+              <a:t>In Firefox environment Maps are not being shown properly when the Map is being shown for the first time</a:t>
+            </a:r>
+            <a:endParaRPr lang="en-GB" dirty="0"/>
+          </a:p>
+        </p:txBody>
+      </p:sp>
+      <p:sp>
+        <p:nvSpPr>
+          <p:cNvPr id="4" name="Date Placeholder 3"/>
+          <p:cNvSpPr>
+            <a:spLocks noGrp="1"/>
+          </p:cNvSpPr>
+          <p:nvPr>
+            <p:ph type="dt" sz="half" idx="10"/>
+          </p:nvPr>
+        </p:nvSpPr>
+        <p:spPr/>
+        <p:txBody>
+          <a:bodyPr/>
+          <a:lstStyle/>
+          <a:p>
+            <a:fld id="{ECC89270-5FA8-454F-BFC3-22A3CF1F8103}" type="datetime1">
+              <a:rPr lang="en-GB" smtClean="0"/>
+              <a:t>17/07/2017</a:t>
+            </a:fld>
+            <a:endParaRPr lang="en-GB"/>
+          </a:p>
+        </p:txBody>
+      </p:sp>
+      <p:sp>
+        <p:nvSpPr>
+          <p:cNvPr id="5" name="Footer Placeholder 4"/>
+          <p:cNvSpPr>
+            <a:spLocks noGrp="1"/>
+          </p:cNvSpPr>
+          <p:nvPr>
+            <p:ph type="ftr" sz="quarter" idx="11"/>
+          </p:nvPr>
+        </p:nvSpPr>
+        <p:spPr/>
+        <p:txBody>
+          <a:bodyPr/>
+          <a:lstStyle/>
+          <a:p>
+            <a:r>
+              <a:rPr lang="en-GB" smtClean="0"/>
+              <a:t>F. Ilic &amp; P. Jurgielewicz</a:t>
+            </a:r>
+            <a:endParaRPr lang="en-GB"/>
+          </a:p>
+        </p:txBody>
+      </p:sp>
+      <p:sp>
+        <p:nvSpPr>
+          <p:cNvPr id="6" name="Slide Number Placeholder 5"/>
+          <p:cNvSpPr>
+            <a:spLocks noGrp="1"/>
+          </p:cNvSpPr>
+          <p:nvPr>
+            <p:ph type="sldNum" sz="quarter" idx="12"/>
+          </p:nvPr>
+        </p:nvSpPr>
+        <p:spPr/>
+        <p:txBody>
+          <a:bodyPr/>
+          <a:lstStyle/>
+          <a:p>
+            <a:fld id="{3524DB9F-9467-4B90-B655-964C21D24326}" type="slidenum">
+              <a:rPr lang="en-GB" smtClean="0"/>
+              <a:t>13</a:t>
+            </a:fld>
+            <a:endParaRPr lang="en-GB"/>
+          </a:p>
+        </p:txBody>
+      </p:sp>
+    </p:spTree>
+    <p:extLst>
+      <p:ext uri="{BB962C8B-B14F-4D97-AF65-F5344CB8AC3E}">
+        <p14:creationId xmlns:p14="http://schemas.microsoft.com/office/powerpoint/2010/main" val="3114844675"/>
+      </p:ext>
+    </p:extLst>
+  </p:cSld>
+  <p:clrMapOvr>
+    <a:masterClrMapping/>
+  </p:clrMapOvr>
+  <p:timing>
+    <p:tnLst>
+      <p:par>
+        <p:cTn id="1" dur="indefinite" restart="never" nodeType="tmRoot"/>
+      </p:par>
+    </p:tnLst>
+  </p:timing>
 </p:sld>
 </file>
 
@@ -3622,7 +4587,11 @@
           <a:p>
             <a:r>
               <a:rPr lang="pl-PL" dirty="0" smtClean="0"/>
-              <a:t>Toggle options: (un)hide </a:t>
+              <a:t>Link </a:t>
+            </a:r>
+            <a:r>
+              <a:rPr lang="pl-PL" dirty="0" smtClean="0"/>
+              <a:t>Me: save current View (contents of </a:t>
             </a:r>
             <a:r>
               <a:rPr lang="pl-PL" b="1" dirty="0" smtClean="0">
@@ -3630,13 +4599,7 @@
                   <a:srgbClr val="7030A0"/>
                 </a:solidFill>
               </a:rPr>
-              <a:t>Options Panel</a:t>
-            </a:r>
-          </a:p>
-          <a:p>
-            <a:r>
-              <a:rPr lang="pl-PL" dirty="0" smtClean="0"/>
-              <a:t>Link Me: save current View (contents of </a:t>
+              <a:t>Options </a:t>
             </a:r>
             <a:r>
               <a:rPr lang="pl-PL" b="1" dirty="0" smtClean="0">
@@ -3644,7 +4607,7 @@
                   <a:srgbClr val="7030A0"/>
                 </a:solidFill>
               </a:rPr>
-              <a:t>Options Panel</a:t>
+              <a:t>Panel</a:t>
             </a:r>
             <a:r>
               <a:rPr lang="pl-PL" dirty="0" smtClean="0">
@@ -3656,13 +4619,37 @@
             </a:r>
             <a:r>
               <a:rPr lang="pl-PL" dirty="0" smtClean="0"/>
-              <a:t>and currently selected </a:t>
+              <a:t>– including type of </a:t>
+            </a:r>
+            <a:r>
+              <a:rPr lang="pl-PL" b="1" dirty="0" smtClean="0">
+                <a:solidFill>
+                  <a:schemeClr val="accent2"/>
+                </a:solidFill>
+              </a:rPr>
+              <a:t>Browsing Mode </a:t>
+            </a:r>
+            <a:r>
+              <a:rPr lang="pl-PL" b="1" dirty="0" smtClean="0"/>
+              <a:t>- </a:t>
+            </a:r>
+            <a:r>
+              <a:rPr lang="pl-PL" dirty="0" smtClean="0"/>
+              <a:t>and </a:t>
+            </a:r>
+            <a:r>
+              <a:rPr lang="pl-PL" dirty="0"/>
+              <a:t>currently </a:t>
+            </a:r>
+            <a:r>
+              <a:rPr lang="pl-PL" dirty="0" smtClean="0"/>
+              <a:t>selected </a:t>
             </a:r>
             <a:r>
               <a:rPr lang="pl-PL" b="1" dirty="0" smtClean="0">
                 <a:solidFill>
                   <a:schemeClr val="accent2">
-                    <a:lumMod val="75000"/>
+                    <a:lumMod val="50000"/>
                   </a:schemeClr>
                 </a:solidFill>
               </a:rPr>
@@ -3688,7 +4675,15 @@
           <a:p>
             <a:r>
               <a:rPr lang="pl-PL" dirty="0" smtClean="0"/>
-              <a:t>Bug, comment, suggestion?: send email to the authors</a:t>
+              <a:t>Bug, comment, suggestion?: send </a:t>
+            </a:r>
+            <a:r>
+              <a:rPr lang="pl-PL" dirty="0" smtClean="0"/>
+              <a:t>an email </a:t>
+            </a:r>
+            <a:r>
+              <a:rPr lang="pl-PL" dirty="0" smtClean="0"/>
+              <a:t>to the authors</a:t>
             </a:r>
           </a:p>
           <a:p>
@@ -3711,9 +4706,9 @@
           <a:bodyPr/>
           <a:lstStyle/>
           <a:p>
-            <a:fld id="{2B6AEE45-96F4-4455-8391-10A3C9D66E61}" type="datetime1">
-              <a:rPr lang="en-GB" smtClean="0"/>
-              <a:t>28/06/2017</a:t>
+            <a:fld id="{95106318-4FD4-4136-9362-4D516595EC7A}" type="datetime1">
+              <a:rPr lang="en-GB" smtClean="0"/>
+              <a:t>17/07/2017</a:t>
             </a:fld>
             <a:endParaRPr lang="en-GB"/>
           </a:p>
@@ -3747,6 +4742,29 @@
               <a:t> &amp; P. Jurgielewicz</a:t>
             </a:r>
             <a:endParaRPr lang="en-GB" dirty="0"/>
+          </a:p>
+        </p:txBody>
+      </p:sp>
+      <p:sp>
+        <p:nvSpPr>
+          <p:cNvPr id="6" name="Slide Number Placeholder 5"/>
+          <p:cNvSpPr>
+            <a:spLocks noGrp="1"/>
+          </p:cNvSpPr>
+          <p:nvPr>
+            <p:ph type="sldNum" sz="quarter" idx="12"/>
+          </p:nvPr>
+        </p:nvSpPr>
+        <p:spPr/>
+        <p:txBody>
+          <a:bodyPr/>
+          <a:lstStyle/>
+          <a:p>
+            <a:fld id="{3524DB9F-9467-4B90-B655-964C21D24326}" type="slidenum">
+              <a:rPr lang="en-GB" smtClean="0"/>
+              <a:t>2</a:t>
+            </a:fld>
+            <a:endParaRPr lang="en-GB"/>
           </a:p>
         </p:txBody>
       </p:sp>
@@ -3760,6 +4778,13 @@
   <p:clrMapOvr>
     <a:masterClrMapping/>
   </p:clrMapOvr>
+  <p:timing>
+    <p:tnLst>
+      <p:par>
+        <p:cTn id="1" dur="indefinite" restart="never" nodeType="tmRoot"/>
+      </p:par>
+    </p:tnLst>
+  </p:timing>
 </p:sld>
 </file>
 
@@ -3827,9 +4852,27 @@
         </p:nvSpPr>
         <p:spPr/>
         <p:txBody>
-          <a:bodyPr/>
-          <a:lstStyle/>
-          <a:p>
+          <a:bodyPr>
+            <a:normAutofit/>
+          </a:bodyPr>
+          <a:lstStyle/>
+          <a:p>
+            <a:r>
+              <a:rPr lang="pl-PL" b="1" dirty="0" smtClean="0">
+                <a:solidFill>
+                  <a:srgbClr val="FF99CC"/>
+                </a:solidFill>
+              </a:rPr>
+              <a:t>Data </a:t>
+            </a:r>
+            <a:r>
+              <a:rPr lang="pl-PL" b="1" dirty="0" smtClean="0">
+                <a:solidFill>
+                  <a:srgbClr val="FF99CC"/>
+                </a:solidFill>
+              </a:rPr>
+              <a:t>picker:</a:t>
+            </a:r>
             <a:r>
               <a:rPr lang="pl-PL" b="1" dirty="0" smtClean="0">
                 <a:solidFill>
@@ -3838,7 +4881,7 @@
                   </a:schemeClr>
                 </a:solidFill>
               </a:rPr>
-              <a:t>A) Data picker: </a:t>
+              <a:t> </a:t>
             </a:r>
             <a:r>
               <a:rPr lang="pl-PL" dirty="0" smtClean="0"/>
@@ -3848,214 +4891,53 @@
               <a:rPr lang="pl-PL" b="1" dirty="0" smtClean="0">
                 <a:solidFill>
                   <a:schemeClr val="accent2">
-                    <a:lumMod val="75000"/>
-                  </a:schemeClr>
-                </a:solidFill>
-              </a:rPr>
-              <a:t>Tab</a:t>
-            </a:r>
-          </a:p>
-          <a:p>
-            <a:r>
-              <a:rPr lang="pl-PL" b="1" dirty="0" smtClean="0">
-                <a:solidFill>
-                  <a:schemeClr val="bg2">
                     <a:lumMod val="50000"/>
                   </a:schemeClr>
                 </a:solidFill>
               </a:rPr>
-              <a:t>B) Run picker:</a:t>
-            </a:r>
-            <a:r>
-              <a:rPr lang="pl-PL" dirty="0" smtClean="0"/>
-              <a:t> click on the browse button       to pick desired Run</a:t>
-            </a:r>
-          </a:p>
-          <a:p>
-            <a:pPr lvl="1"/>
-            <a:r>
-              <a:rPr lang="pl-PL" dirty="0" smtClean="0"/>
-              <a:t>Top one input Run is considered as REFERENCE</a:t>
-            </a:r>
-          </a:p>
-          <a:p>
-            <a:pPr lvl="1"/>
-            <a:r>
-              <a:rPr lang="pl-PL" dirty="0" smtClean="0"/>
-              <a:t>Bottom one input Run is considered as CURRENT</a:t>
-            </a:r>
-          </a:p>
-          <a:p>
-            <a:r>
-              <a:rPr lang="pl-PL" dirty="0" smtClean="0"/>
-              <a:t>Use          to navigate between adjacent Runs</a:t>
-            </a:r>
-          </a:p>
-          <a:p>
-            <a:pPr lvl="1"/>
-            <a:r>
-              <a:rPr lang="pl-PL" dirty="0" smtClean="0"/>
-              <a:t>Tip: use your keyboard arrows to navigate in CURRENT</a:t>
-            </a:r>
-            <a:br>
-              <a:rPr lang="pl-PL" dirty="0" smtClean="0"/>
-            </a:br>
-            <a:r>
-              <a:rPr lang="pl-PL" dirty="0" smtClean="0"/>
-              <a:t>(hold Shift + arrow to change  REFERENCE);</a:t>
-            </a:r>
-            <a:br>
-              <a:rPr lang="pl-PL" dirty="0" smtClean="0"/>
-            </a:br>
-            <a:r>
-              <a:rPr lang="pl-PL" dirty="0" smtClean="0"/>
-              <a:t>especially useful when </a:t>
-            </a:r>
+              <a:t>Tab </a:t>
+            </a:r>
+            <a:endParaRPr lang="pl-PL" dirty="0" smtClean="0">
+              <a:solidFill>
+                <a:schemeClr val="accent2">
+                  <a:lumMod val="50000"/>
+                </a:schemeClr>
+              </a:solidFill>
+            </a:endParaRPr>
+          </a:p>
+          <a:p>
             <a:r>
               <a:rPr lang="pl-PL" b="1" dirty="0" smtClean="0">
                 <a:solidFill>
-                  <a:srgbClr val="7030A0"/>
+                  <a:schemeClr val="accent2"/>
                 </a:solidFill>
               </a:rPr>
-              <a:t>Options Panel </a:t>
-            </a:r>
-            <a:r>
-              <a:rPr lang="pl-PL" dirty="0" smtClean="0"/>
-              <a:t>is hidden with</a:t>
-            </a:r>
-            <a:br>
-              <a:rPr lang="pl-PL" dirty="0" smtClean="0"/>
-            </a:br>
+              <a:t>Browsing Mode: </a:t>
+            </a:r>
+          </a:p>
+          <a:p>
+            <a:pPr lvl="1"/>
+            <a:r>
+              <a:rPr lang="pl-PL" dirty="0" smtClean="0"/>
+              <a:t>Compare: allows to directly compare data from 2 different Run Datasets</a:t>
+            </a:r>
+          </a:p>
+          <a:p>
+            <a:pPr lvl="1"/>
+            <a:r>
+              <a:rPr lang="pl-PL" dirty="0" smtClean="0"/>
+              <a:t>Timeline: switches to slideshow mode in which Tracker Maps in a given range will be presented; only png data will be shown in this mode</a:t>
+            </a:r>
+            <a:endParaRPr lang="pl-PL" dirty="0" smtClean="0"/>
+          </a:p>
+          <a:p>
+            <a:pPr marL="0" indent="0">
+              <a:buNone/>
+            </a:pPr>
             <a:endParaRPr lang="en-GB" dirty="0"/>
           </a:p>
         </p:txBody>
       </p:sp>
-      <p:pic>
-        <p:nvPicPr>
-          <p:cNvPr id="4" name="Picture 3"/>
-          <p:cNvPicPr>
-            <a:picLocks noChangeAspect="1"/>
-          </p:cNvPicPr>
-          <p:nvPr/>
-        </p:nvPicPr>
-        <p:blipFill>
-          <a:blip r:embed="rId2"/>
-          <a:stretch>
-            <a:fillRect/>
-          </a:stretch>
-        </p:blipFill>
-        <p:spPr>
-          <a:xfrm>
-            <a:off x="7284798" y="2809046"/>
-            <a:ext cx="365792" cy="312447"/>
-          </a:xfrm>
-          <a:prstGeom prst="rect">
-            <a:avLst/>
-          </a:prstGeom>
-        </p:spPr>
-      </p:pic>
-      <p:pic>
-        <p:nvPicPr>
-          <p:cNvPr id="5" name="Picture 4"/>
-          <p:cNvPicPr>
-            <a:picLocks noChangeAspect="1"/>
-          </p:cNvPicPr>
-          <p:nvPr/>
-        </p:nvPicPr>
-        <p:blipFill>
-          <a:blip r:embed="rId3">
-            <a:extLst>
-              <a:ext uri="{28A0092B-C50C-407E-A947-70E740481C1C}">
-                <a14:useLocalDpi xmlns:a14="http://schemas.microsoft.com/office/drawing/2010/main" val="0"/>
-              </a:ext>
-            </a:extLst>
-          </a:blip>
-          <a:stretch>
-            <a:fillRect/>
-          </a:stretch>
-        </p:blipFill>
-        <p:spPr>
-          <a:xfrm>
-            <a:off x="8305894" y="3106253"/>
-            <a:ext cx="3886106" cy="3644537"/>
-          </a:xfrm>
-          <a:prstGeom prst="rect">
-            <a:avLst/>
-          </a:prstGeom>
-        </p:spPr>
-      </p:pic>
-      <p:pic>
-        <p:nvPicPr>
-          <p:cNvPr id="6" name="Picture 5"/>
-          <p:cNvPicPr>
-            <a:picLocks noChangeAspect="1"/>
-          </p:cNvPicPr>
-          <p:nvPr/>
-        </p:nvPicPr>
-        <p:blipFill>
-          <a:blip r:embed="rId4"/>
-          <a:stretch>
-            <a:fillRect/>
-          </a:stretch>
-        </p:blipFill>
-        <p:spPr>
-          <a:xfrm>
-            <a:off x="2109665" y="4064435"/>
-            <a:ext cx="342930" cy="289585"/>
-          </a:xfrm>
-          <a:prstGeom prst="rect">
-            <a:avLst/>
-          </a:prstGeom>
-        </p:spPr>
-      </p:pic>
-      <p:pic>
-        <p:nvPicPr>
-          <p:cNvPr id="7" name="Picture 6"/>
-          <p:cNvPicPr>
-            <a:picLocks noChangeAspect="1"/>
-          </p:cNvPicPr>
-          <p:nvPr/>
-        </p:nvPicPr>
-        <p:blipFill>
-          <a:blip r:embed="rId5"/>
-          <a:stretch>
-            <a:fillRect/>
-          </a:stretch>
-        </p:blipFill>
-        <p:spPr>
-          <a:xfrm>
-            <a:off x="1774356" y="4079676"/>
-            <a:ext cx="335309" cy="274344"/>
-          </a:xfrm>
-          <a:prstGeom prst="rect">
-            <a:avLst/>
-          </a:prstGeom>
-        </p:spPr>
-      </p:pic>
-      <p:pic>
-        <p:nvPicPr>
-          <p:cNvPr id="8" name="Picture 7"/>
-          <p:cNvPicPr>
-            <a:picLocks noChangeAspect="1"/>
-          </p:cNvPicPr>
-          <p:nvPr/>
-        </p:nvPicPr>
-        <p:blipFill>
-          <a:blip r:embed="rId6"/>
-          <a:stretch>
-            <a:fillRect/>
-          </a:stretch>
-        </p:blipFill>
-        <p:spPr>
-          <a:xfrm>
-            <a:off x="1511443" y="5612118"/>
-            <a:ext cx="1196444" cy="266723"/>
-          </a:xfrm>
-          <a:prstGeom prst="rect">
-            <a:avLst/>
-          </a:prstGeom>
-        </p:spPr>
-      </p:pic>
       <p:sp>
         <p:nvSpPr>
           <p:cNvPr id="9" name="Date Placeholder 8"/>
@@ -4071,9 +4953,9 @@
           <a:bodyPr/>
           <a:lstStyle/>
           <a:p>
-            <a:fld id="{F4DBC8DC-7B3E-4B1E-AFA2-7AF2049188F5}" type="datetime1">
-              <a:rPr lang="en-GB" smtClean="0"/>
-              <a:t>28/06/2017</a:t>
+            <a:fld id="{CF16D5FF-911A-4C3E-9CB6-5A715AA3E49C}" type="datetime1">
+              <a:rPr lang="en-GB" smtClean="0"/>
+              <a:t>17/07/2017</a:t>
             </a:fld>
             <a:endParaRPr lang="en-GB"/>
           </a:p>
@@ -4098,6 +4980,29 @@
               <a:rPr lang="en-GB" smtClean="0"/>
               <a:t>F. Ilic &amp; P. Jurgielewicz</a:t>
             </a:r>
+            <a:endParaRPr lang="en-GB"/>
+          </a:p>
+        </p:txBody>
+      </p:sp>
+      <p:sp>
+        <p:nvSpPr>
+          <p:cNvPr id="11" name="Slide Number Placeholder 10"/>
+          <p:cNvSpPr>
+            <a:spLocks noGrp="1"/>
+          </p:cNvSpPr>
+          <p:nvPr>
+            <p:ph type="sldNum" sz="quarter" idx="12"/>
+          </p:nvPr>
+        </p:nvSpPr>
+        <p:spPr/>
+        <p:txBody>
+          <a:bodyPr/>
+          <a:lstStyle/>
+          <a:p>
+            <a:fld id="{3524DB9F-9467-4B90-B655-964C21D24326}" type="slidenum">
+              <a:rPr lang="en-GB" smtClean="0"/>
+              <a:t>3</a:t>
+            </a:fld>
             <a:endParaRPr lang="en-GB"/>
           </a:p>
         </p:txBody>
@@ -4112,6 +5017,13 @@
   <p:clrMapOvr>
     <a:masterClrMapping/>
   </p:clrMapOvr>
+  <p:timing>
+    <p:tnLst>
+      <p:par>
+        <p:cTn id="1" dur="indefinite" restart="never" nodeType="tmRoot"/>
+      </p:par>
+    </p:tnLst>
+  </p:timing>
 </p:sld>
 </file>
 
@@ -4148,47 +5060,16 @@
           <a:lstStyle/>
           <a:p>
             <a:r>
-              <a:rPr lang="pl-PL" dirty="0" smtClean="0"/>
-              <a:t>Section 3: </a:t>
-            </a:r>
-            <a:r>
-              <a:rPr lang="pl-PL" b="1" dirty="0" smtClean="0">
+              <a:rPr lang="pl-PL" dirty="0"/>
+              <a:t>Section 2: </a:t>
+            </a:r>
+            <a:r>
+              <a:rPr lang="pl-PL" b="1" dirty="0">
                 <a:solidFill>
-                  <a:schemeClr val="accent2">
-                    <a:lumMod val="75000"/>
-                  </a:schemeClr>
+                  <a:srgbClr val="7030A0"/>
                 </a:solidFill>
               </a:rPr>
-              <a:t>Tab Bar</a:t>
-            </a:r>
-            <a:endParaRPr lang="en-GB" b="1" dirty="0">
-              <a:solidFill>
-                <a:schemeClr val="accent2">
-                  <a:lumMod val="75000"/>
-                </a:schemeClr>
-              </a:solidFill>
-            </a:endParaRPr>
-          </a:p>
-        </p:txBody>
-      </p:sp>
-      <p:sp>
-        <p:nvSpPr>
-          <p:cNvPr id="3" name="Content Placeholder 2"/>
-          <p:cNvSpPr>
-            <a:spLocks noGrp="1"/>
-          </p:cNvSpPr>
-          <p:nvPr>
-            <p:ph idx="1"/>
-          </p:nvPr>
-        </p:nvSpPr>
-        <p:spPr/>
-        <p:txBody>
-          <a:bodyPr/>
-          <a:lstStyle/>
-          <a:p>
-            <a:r>
-              <a:rPr lang="pl-PL" dirty="0" smtClean="0"/>
-              <a:t>Populates when User decides which data to present (using</a:t>
+              <a:t>Options </a:t>
             </a:r>
             <a:r>
               <a:rPr lang="pl-PL" b="1" dirty="0" smtClean="0">
@@ -4196,30 +5077,192 @@
                   <a:srgbClr val="7030A0"/>
                 </a:solidFill>
               </a:rPr>
-              <a:t> Options Panel </a:t>
-            </a:r>
+              <a:t>Panel contd</a:t>
+            </a:r>
+            <a:endParaRPr lang="en-GB" dirty="0"/>
+          </a:p>
+        </p:txBody>
+      </p:sp>
+      <p:sp>
+        <p:nvSpPr>
+          <p:cNvPr id="3" name="Content Placeholder 2"/>
+          <p:cNvSpPr>
+            <a:spLocks noGrp="1"/>
+          </p:cNvSpPr>
+          <p:nvPr>
+            <p:ph idx="1"/>
+          </p:nvPr>
+        </p:nvSpPr>
+        <p:spPr/>
+        <p:txBody>
+          <a:bodyPr>
+            <a:normAutofit/>
+          </a:bodyPr>
+          <a:lstStyle/>
+          <a:p>
             <a:r>
               <a:rPr lang="pl-PL" b="1" dirty="0" smtClean="0">
                 <a:solidFill>
-                  <a:schemeClr val="bg2">
-                    <a:lumMod val="50000"/>
+                  <a:schemeClr val="accent1">
+                    <a:lumMod val="75000"/>
                   </a:schemeClr>
                 </a:solidFill>
               </a:rPr>
-              <a:t>A)</a:t>
+              <a:t>Run </a:t>
+            </a:r>
+            <a:r>
+              <a:rPr lang="pl-PL" b="1" dirty="0">
+                <a:solidFill>
+                  <a:schemeClr val="accent1">
+                    <a:lumMod val="75000"/>
+                  </a:schemeClr>
+                </a:solidFill>
+              </a:rPr>
+              <a:t>picker:</a:t>
+            </a:r>
+            <a:r>
+              <a:rPr lang="pl-PL" dirty="0">
+                <a:solidFill>
+                  <a:schemeClr val="accent1">
+                    <a:lumMod val="75000"/>
+                  </a:schemeClr>
+                </a:solidFill>
+              </a:rPr>
+              <a:t> </a:t>
+            </a:r>
+            <a:r>
+              <a:rPr lang="pl-PL" dirty="0"/>
+              <a:t>click on the browse button       to pick desired </a:t>
+            </a:r>
+            <a:r>
+              <a:rPr lang="pl-PL" dirty="0" smtClean="0"/>
+              <a:t>Run dataset</a:t>
+            </a:r>
+            <a:endParaRPr lang="pl-PL" dirty="0"/>
+          </a:p>
+          <a:p>
+            <a:pPr lvl="1"/>
+            <a:r>
+              <a:rPr lang="pl-PL" dirty="0"/>
+              <a:t>Top one input Run is considered as </a:t>
+            </a:r>
+            <a:r>
+              <a:rPr lang="pl-PL" dirty="0" smtClean="0"/>
+              <a:t>REFERENCE/FROM (Compare/Timeline </a:t>
+            </a:r>
+            <a:r>
+              <a:rPr lang="pl-PL" b="1" dirty="0">
+                <a:solidFill>
+                  <a:schemeClr val="accent2"/>
+                </a:solidFill>
+              </a:rPr>
+              <a:t>Browsing </a:t>
+            </a:r>
+            <a:r>
+              <a:rPr lang="pl-PL" b="1" dirty="0" smtClean="0">
+                <a:solidFill>
+                  <a:schemeClr val="accent2"/>
+                </a:solidFill>
+              </a:rPr>
+              <a:t>Mode</a:t>
             </a:r>
             <a:r>
               <a:rPr lang="pl-PL" dirty="0" smtClean="0"/>
               <a:t>)</a:t>
             </a:r>
-          </a:p>
-          <a:p>
-            <a:r>
-              <a:rPr lang="pl-PL" dirty="0" smtClean="0"/>
-              <a:t>Tip: if you decide you do not want given dataset (map/log) you can either uncheck corresponding checkbox on </a:t>
+            <a:endParaRPr lang="pl-PL" dirty="0"/>
+          </a:p>
+          <a:p>
+            <a:pPr lvl="1"/>
+            <a:r>
+              <a:rPr lang="pl-PL" dirty="0"/>
+              <a:t>Bottom one input Run is considered as </a:t>
+            </a:r>
+            <a:r>
+              <a:rPr lang="pl-PL" dirty="0" smtClean="0"/>
+              <a:t>CURRENT/TO (Compare/Timeline </a:t>
+            </a:r>
+            <a:r>
+              <a:rPr lang="pl-PL" b="1" dirty="0">
+                <a:solidFill>
+                  <a:schemeClr val="accent2"/>
+                </a:solidFill>
+              </a:rPr>
+              <a:t>Browsing </a:t>
             </a:r>
             <a:r>
               <a:rPr lang="pl-PL" b="1" dirty="0" smtClean="0">
+                <a:solidFill>
+                  <a:schemeClr val="accent2"/>
+                </a:solidFill>
+              </a:rPr>
+              <a:t>Mode</a:t>
+            </a:r>
+            <a:r>
+              <a:rPr lang="pl-PL" dirty="0" smtClean="0"/>
+              <a:t>)</a:t>
+            </a:r>
+            <a:endParaRPr lang="pl-PL" dirty="0"/>
+          </a:p>
+          <a:p>
+            <a:r>
+              <a:rPr lang="pl-PL" dirty="0" smtClean="0"/>
+              <a:t>Use          buttons to navigate between adjacent Runs</a:t>
+            </a:r>
+            <a:endParaRPr lang="pl-PL" dirty="0"/>
+          </a:p>
+          <a:p>
+            <a:pPr lvl="1"/>
+            <a:r>
+              <a:rPr lang="pl-PL" dirty="0"/>
+              <a:t>Tip: use your keyboard </a:t>
+            </a:r>
+            <a:r>
+              <a:rPr lang="pl-PL" dirty="0" smtClean="0"/>
+              <a:t>to </a:t>
+            </a:r>
+            <a:r>
+              <a:rPr lang="pl-PL" dirty="0"/>
+              <a:t>navigate </a:t>
+            </a:r>
+            <a:r>
+              <a:rPr lang="pl-PL" dirty="0" smtClean="0"/>
+              <a:t>between runs:</a:t>
+            </a:r>
+          </a:p>
+          <a:p>
+            <a:pPr lvl="2"/>
+            <a:r>
+              <a:rPr lang="pl-PL" dirty="0" smtClean="0"/>
+              <a:t>U/J – previous REFERENCE/FROM</a:t>
+            </a:r>
+          </a:p>
+          <a:p>
+            <a:pPr lvl="2"/>
+            <a:r>
+              <a:rPr lang="pl-PL" dirty="0" smtClean="0"/>
+              <a:t>I/K – next REFERENCE/FROM</a:t>
+            </a:r>
+          </a:p>
+          <a:p>
+            <a:pPr lvl="2"/>
+            <a:r>
+              <a:rPr lang="pl-PL" dirty="0" smtClean="0"/>
+              <a:t>O/L – open browser for REFERENCE/FROM</a:t>
+            </a:r>
+          </a:p>
+          <a:p>
+            <a:pPr lvl="1"/>
+            <a:r>
+              <a:rPr lang="pl-PL" dirty="0" smtClean="0"/>
+              <a:t>especially </a:t>
+            </a:r>
+            <a:r>
+              <a:rPr lang="pl-PL" dirty="0"/>
+              <a:t>useful when </a:t>
+            </a:r>
+            <a:r>
+              <a:rPr lang="pl-PL" b="1" dirty="0">
                 <a:solidFill>
                   <a:srgbClr val="7030A0"/>
                 </a:solidFill>
@@ -4227,30 +5270,17 @@
               <a:t>Options Panel </a:t>
             </a:r>
             <a:r>
-              <a:rPr lang="pl-PL" dirty="0" smtClean="0"/>
-              <a:t>or you can click </a:t>
-            </a:r>
-            <a:r>
-              <a:rPr lang="pl-PL" u="sng" dirty="0" smtClean="0"/>
-              <a:t>Middle Mouse Button (MMB) </a:t>
-            </a:r>
-            <a:r>
-              <a:rPr lang="pl-PL" dirty="0" smtClean="0"/>
-              <a:t>to remove this; the latter is usuful with hidden </a:t>
-            </a:r>
-            <a:r>
-              <a:rPr lang="pl-PL" b="1" dirty="0" smtClean="0">
-                <a:solidFill>
-                  <a:srgbClr val="7030A0"/>
-                </a:solidFill>
-              </a:rPr>
-              <a:t>Options Panel</a:t>
-            </a:r>
-            <a:endParaRPr lang="en-GB" b="1" dirty="0">
-              <a:solidFill>
-                <a:srgbClr val="7030A0"/>
-              </a:solidFill>
-            </a:endParaRPr>
+              <a:rPr lang="pl-PL" dirty="0"/>
+              <a:t>is </a:t>
+            </a:r>
+            <a:r>
+              <a:rPr lang="pl-PL" dirty="0" smtClean="0"/>
+              <a:t>hidden</a:t>
+            </a:r>
+            <a:endParaRPr lang="pl-PL" dirty="0"/>
+          </a:p>
+          <a:p>
+            <a:endParaRPr lang="en-GB" dirty="0"/>
           </a:p>
         </p:txBody>
       </p:sp>
@@ -4269,9 +5299,9 @@
           <a:bodyPr/>
           <a:lstStyle/>
           <a:p>
-            <a:fld id="{2C544F65-E922-4A1B-BEB6-88098DC7DED2}" type="datetime1">
-              <a:rPr lang="en-GB" smtClean="0"/>
-              <a:t>28/06/2017</a:t>
+            <a:fld id="{BDB1315C-04B6-4E2D-81A4-8AE0EF989144}" type="datetime1">
+              <a:rPr lang="en-GB" smtClean="0"/>
+              <a:t>17/07/2017</a:t>
             </a:fld>
             <a:endParaRPr lang="en-GB"/>
           </a:p>
@@ -4296,6 +5326,131 @@
               <a:rPr lang="en-GB" smtClean="0"/>
               <a:t>F. Ilic &amp; P. Jurgielewicz</a:t>
             </a:r>
+            <a:endParaRPr lang="en-GB"/>
+          </a:p>
+        </p:txBody>
+      </p:sp>
+      <p:pic>
+        <p:nvPicPr>
+          <p:cNvPr id="6" name="Picture 5"/>
+          <p:cNvPicPr>
+            <a:picLocks noChangeAspect="1"/>
+          </p:cNvPicPr>
+          <p:nvPr/>
+        </p:nvPicPr>
+        <p:blipFill>
+          <a:blip r:embed="rId2"/>
+          <a:stretch>
+            <a:fillRect/>
+          </a:stretch>
+        </p:blipFill>
+        <p:spPr>
+          <a:xfrm>
+            <a:off x="2103487" y="3842013"/>
+            <a:ext cx="342930" cy="289585"/>
+          </a:xfrm>
+          <a:prstGeom prst="rect">
+            <a:avLst/>
+          </a:prstGeom>
+        </p:spPr>
+      </p:pic>
+      <p:pic>
+        <p:nvPicPr>
+          <p:cNvPr id="7" name="Picture 6"/>
+          <p:cNvPicPr>
+            <a:picLocks noChangeAspect="1"/>
+          </p:cNvPicPr>
+          <p:nvPr/>
+        </p:nvPicPr>
+        <p:blipFill>
+          <a:blip r:embed="rId3"/>
+          <a:stretch>
+            <a:fillRect/>
+          </a:stretch>
+        </p:blipFill>
+        <p:spPr>
+          <a:xfrm>
+            <a:off x="1768178" y="3857254"/>
+            <a:ext cx="335309" cy="274344"/>
+          </a:xfrm>
+          <a:prstGeom prst="rect">
+            <a:avLst/>
+          </a:prstGeom>
+        </p:spPr>
+      </p:pic>
+      <p:pic>
+        <p:nvPicPr>
+          <p:cNvPr id="8" name="Picture 7"/>
+          <p:cNvPicPr>
+            <a:picLocks noChangeAspect="1"/>
+          </p:cNvPicPr>
+          <p:nvPr/>
+        </p:nvPicPr>
+        <p:blipFill>
+          <a:blip r:embed="rId4"/>
+          <a:stretch>
+            <a:fillRect/>
+          </a:stretch>
+        </p:blipFill>
+        <p:spPr>
+          <a:xfrm>
+            <a:off x="6821420" y="1874842"/>
+            <a:ext cx="365792" cy="312447"/>
+          </a:xfrm>
+          <a:prstGeom prst="rect">
+            <a:avLst/>
+          </a:prstGeom>
+        </p:spPr>
+      </p:pic>
+      <p:pic>
+        <p:nvPicPr>
+          <p:cNvPr id="9" name="Picture 8"/>
+          <p:cNvPicPr>
+            <a:picLocks noChangeAspect="1"/>
+          </p:cNvPicPr>
+          <p:nvPr/>
+        </p:nvPicPr>
+        <p:blipFill>
+          <a:blip r:embed="rId5">
+            <a:extLst>
+              <a:ext uri="{28A0092B-C50C-407E-A947-70E740481C1C}">
+                <a14:useLocalDpi xmlns:a14="http://schemas.microsoft.com/office/drawing/2010/main" val="0"/>
+              </a:ext>
+            </a:extLst>
+          </a:blip>
+          <a:stretch>
+            <a:fillRect/>
+          </a:stretch>
+        </p:blipFill>
+        <p:spPr>
+          <a:xfrm>
+            <a:off x="8822724" y="3352036"/>
+            <a:ext cx="3329899" cy="3122905"/>
+          </a:xfrm>
+          <a:prstGeom prst="rect">
+            <a:avLst/>
+          </a:prstGeom>
+        </p:spPr>
+      </p:pic>
+      <p:sp>
+        <p:nvSpPr>
+          <p:cNvPr id="10" name="Slide Number Placeholder 9"/>
+          <p:cNvSpPr>
+            <a:spLocks noGrp="1"/>
+          </p:cNvSpPr>
+          <p:nvPr>
+            <p:ph type="sldNum" sz="quarter" idx="12"/>
+          </p:nvPr>
+        </p:nvSpPr>
+        <p:spPr/>
+        <p:txBody>
+          <a:bodyPr/>
+          <a:lstStyle/>
+          <a:p>
+            <a:fld id="{3524DB9F-9467-4B90-B655-964C21D24326}" type="slidenum">
+              <a:rPr lang="en-GB" smtClean="0"/>
+              <a:t>4</a:t>
+            </a:fld>
             <a:endParaRPr lang="en-GB"/>
           </a:p>
         </p:txBody>
@@ -4303,13 +5458,20 @@
     </p:spTree>
     <p:extLst>
       <p:ext uri="{BB962C8B-B14F-4D97-AF65-F5344CB8AC3E}">
-        <p14:creationId xmlns:p14="http://schemas.microsoft.com/office/powerpoint/2010/main" val="1862011032"/>
+        <p14:creationId xmlns:p14="http://schemas.microsoft.com/office/powerpoint/2010/main" val="3623124592"/>
       </p:ext>
     </p:extLst>
   </p:cSld>
   <p:clrMapOvr>
     <a:masterClrMapping/>
   </p:clrMapOvr>
+  <p:timing>
+    <p:tnLst>
+      <p:par>
+        <p:cTn id="1" dur="indefinite" restart="never" nodeType="tmRoot"/>
+      </p:par>
+    </p:tnLst>
+  </p:timing>
 </p:sld>
 </file>
 
@@ -4346,22 +5508,18 @@
           <a:lstStyle/>
           <a:p>
             <a:r>
-              <a:rPr lang="pl-PL" dirty="0" smtClean="0"/>
-              <a:t>Section 4: </a:t>
-            </a:r>
-            <a:r>
-              <a:rPr lang="pl-PL" b="1" dirty="0" smtClean="0">
+              <a:rPr lang="pl-PL" dirty="0"/>
+              <a:t>Section 2: </a:t>
+            </a:r>
+            <a:r>
+              <a:rPr lang="pl-PL" b="1" dirty="0">
                 <a:solidFill>
-                  <a:schemeClr val="accent6"/>
+                  <a:srgbClr val="7030A0"/>
                 </a:solidFill>
               </a:rPr>
-              <a:t>Data Show</a:t>
-            </a:r>
-            <a:endParaRPr lang="en-GB" b="1" dirty="0">
-              <a:solidFill>
-                <a:schemeClr val="accent6"/>
-              </a:solidFill>
-            </a:endParaRPr>
+              <a:t>Options Panel contd</a:t>
+            </a:r>
+            <a:endParaRPr lang="en-GB" dirty="0"/>
           </a:p>
         </p:txBody>
       </p:sp>
@@ -4382,69 +5540,23 @@
           <a:p>
             <a:r>
               <a:rPr lang="pl-PL" dirty="0" smtClean="0"/>
-              <a:t>Presents data for currently chosen dataset in </a:t>
-            </a:r>
-            <a:r>
-              <a:rPr lang="pl-PL" b="1" dirty="0" smtClean="0">
+              <a:t>Very bottom button of this section    - toggle </a:t>
+            </a:r>
+            <a:r>
+              <a:rPr lang="pl-PL" dirty="0"/>
+              <a:t>options: (un)hide </a:t>
+            </a:r>
+            <a:r>
+              <a:rPr lang="pl-PL" b="1" dirty="0">
                 <a:solidFill>
-                  <a:schemeClr val="accent2">
-                    <a:lumMod val="75000"/>
-                  </a:schemeClr>
+                  <a:srgbClr val="7030A0"/>
                 </a:solidFill>
               </a:rPr>
-              <a:t>Tab Bar </a:t>
-            </a:r>
-            <a:r>
-              <a:rPr lang="pl-PL" dirty="0" smtClean="0"/>
-              <a:t>with REFERENCE Run on the left and CURRENT on the right</a:t>
-            </a:r>
-          </a:p>
-          <a:p>
-            <a:r>
-              <a:rPr lang="pl-PL" dirty="0" smtClean="0"/>
-              <a:t>Data can be either Images or Text:</a:t>
-            </a:r>
-          </a:p>
-          <a:p>
-            <a:pPr lvl="1"/>
-            <a:r>
-              <a:rPr lang="pl-PL" dirty="0" smtClean="0"/>
-              <a:t>Images: they allow for panning(dragging) and zooming with your </a:t>
-            </a:r>
-            <a:r>
-              <a:rPr lang="pl-PL" u="sng" dirty="0" smtClean="0"/>
-              <a:t>Mouse</a:t>
-            </a:r>
-            <a:r>
-              <a:rPr lang="pl-PL" dirty="0" smtClean="0"/>
-              <a:t> and its </a:t>
-            </a:r>
-            <a:r>
-              <a:rPr lang="pl-PL" u="sng" dirty="0" smtClean="0"/>
-              <a:t>Scroll,</a:t>
-            </a:r>
-            <a:r>
-              <a:rPr lang="pl-PL" dirty="0" smtClean="0"/>
-              <a:t> keeping the same transformation in both views</a:t>
-            </a:r>
-          </a:p>
-          <a:p>
-            <a:pPr lvl="1"/>
-            <a:r>
-              <a:rPr lang="pl-PL" dirty="0" smtClean="0"/>
-              <a:t>Text files </a:t>
-            </a:r>
-          </a:p>
-          <a:p>
-            <a:r>
-              <a:rPr lang="pl-PL" dirty="0" smtClean="0"/>
-              <a:t>Both forms allow to make comparison views using </a:t>
-            </a:r>
-            <a:r>
-              <a:rPr lang="pl-PL" b="1" dirty="0" smtClean="0"/>
-              <a:t>Comparison Bar</a:t>
-            </a:r>
-            <a:endParaRPr lang="en-GB" b="1" dirty="0"/>
+              <a:t>Options Panel</a:t>
+            </a:r>
+          </a:p>
+          <a:p>
+            <a:endParaRPr lang="en-GB" dirty="0"/>
           </a:p>
         </p:txBody>
       </p:sp>
@@ -4463,9 +5575,9 @@
           <a:bodyPr/>
           <a:lstStyle/>
           <a:p>
-            <a:fld id="{1B888C9D-B06C-4381-8C03-CA4A49E3C3B2}" type="datetime1">
-              <a:rPr lang="en-GB" smtClean="0"/>
-              <a:t>28/06/2017</a:t>
+            <a:fld id="{428885FD-27FD-4E64-BF01-054254D78537}" type="datetime1">
+              <a:rPr lang="en-GB" smtClean="0"/>
+              <a:t>17/07/2017</a:t>
             </a:fld>
             <a:endParaRPr lang="en-GB"/>
           </a:p>
@@ -4490,6 +5602,53 @@
               <a:rPr lang="en-GB" smtClean="0"/>
               <a:t>F. Ilic &amp; P. Jurgielewicz</a:t>
             </a:r>
+            <a:endParaRPr lang="en-GB"/>
+          </a:p>
+        </p:txBody>
+      </p:sp>
+      <p:pic>
+        <p:nvPicPr>
+          <p:cNvPr id="6" name="Picture 5"/>
+          <p:cNvPicPr>
+            <a:picLocks noChangeAspect="1"/>
+          </p:cNvPicPr>
+          <p:nvPr/>
+        </p:nvPicPr>
+        <p:blipFill>
+          <a:blip r:embed="rId2"/>
+          <a:stretch>
+            <a:fillRect/>
+          </a:stretch>
+        </p:blipFill>
+        <p:spPr>
+          <a:xfrm>
+            <a:off x="6202704" y="2018786"/>
+            <a:ext cx="219075" cy="114300"/>
+          </a:xfrm>
+          <a:prstGeom prst="rect">
+            <a:avLst/>
+          </a:prstGeom>
+        </p:spPr>
+      </p:pic>
+      <p:sp>
+        <p:nvSpPr>
+          <p:cNvPr id="7" name="Slide Number Placeholder 6"/>
+          <p:cNvSpPr>
+            <a:spLocks noGrp="1"/>
+          </p:cNvSpPr>
+          <p:nvPr>
+            <p:ph type="sldNum" sz="quarter" idx="12"/>
+          </p:nvPr>
+        </p:nvSpPr>
+        <p:spPr/>
+        <p:txBody>
+          <a:bodyPr/>
+          <a:lstStyle/>
+          <a:p>
+            <a:fld id="{3524DB9F-9467-4B90-B655-964C21D24326}" type="slidenum">
+              <a:rPr lang="en-GB" smtClean="0"/>
+              <a:t>5</a:t>
+            </a:fld>
             <a:endParaRPr lang="en-GB"/>
           </a:p>
         </p:txBody>
@@ -4497,13 +5656,20 @@
     </p:spTree>
     <p:extLst>
       <p:ext uri="{BB962C8B-B14F-4D97-AF65-F5344CB8AC3E}">
-        <p14:creationId xmlns:p14="http://schemas.microsoft.com/office/powerpoint/2010/main" val="3887732259"/>
+        <p14:creationId xmlns:p14="http://schemas.microsoft.com/office/powerpoint/2010/main" val="118724892"/>
       </p:ext>
     </p:extLst>
   </p:cSld>
   <p:clrMapOvr>
     <a:masterClrMapping/>
   </p:clrMapOvr>
+  <p:timing>
+    <p:tnLst>
+      <p:par>
+        <p:cTn id="1" dur="indefinite" restart="never" nodeType="tmRoot"/>
+      </p:par>
+    </p:tnLst>
+  </p:timing>
 </p:sld>
 </file>
 
@@ -4541,122 +5707,190 @@
           <a:p>
             <a:r>
               <a:rPr lang="pl-PL" dirty="0" smtClean="0"/>
-              <a:t>Section 5: </a:t>
-            </a:r>
-            <a:r>
-              <a:rPr lang="pl-PL" b="1" dirty="0" smtClean="0"/>
-              <a:t>Comparison Bar</a:t>
-            </a:r>
-            <a:endParaRPr lang="en-GB" b="1" dirty="0"/>
-          </a:p>
-        </p:txBody>
-      </p:sp>
-      <p:sp>
-        <p:nvSpPr>
-          <p:cNvPr id="3" name="Content Placeholder 2"/>
-          <p:cNvSpPr>
-            <a:spLocks noGrp="1"/>
-          </p:cNvSpPr>
-          <p:nvPr>
-            <p:ph idx="1"/>
-          </p:nvPr>
-        </p:nvSpPr>
-        <p:spPr/>
-        <p:txBody>
-          <a:bodyPr/>
-          <a:lstStyle/>
-          <a:p>
-            <a:r>
-              <a:rPr lang="pl-PL" dirty="0" smtClean="0"/>
-              <a:t>Comparison Bar is always docked to the bottom of current view</a:t>
-            </a:r>
-          </a:p>
-          <a:p>
-            <a:r>
-              <a:rPr lang="pl-PL" dirty="0" smtClean="0"/>
-              <a:t>Type of comparison depends on the type of data:</a:t>
-            </a:r>
-          </a:p>
-          <a:p>
-            <a:pPr lvl="1"/>
-            <a:r>
-              <a:rPr lang="pl-PL" dirty="0" smtClean="0"/>
-              <a:t>Image: Comparison is done by subtracting values in each pixel: </a:t>
-            </a:r>
-            <a:br>
-              <a:rPr lang="pl-PL" dirty="0" smtClean="0"/>
-            </a:br>
-            <a:r>
-              <a:rPr lang="pl-PL" dirty="0" smtClean="0"/>
-              <a:t>DIFF = REFERENCE – CURRENT</a:t>
-            </a:r>
-            <a:br>
-              <a:rPr lang="pl-PL" dirty="0" smtClean="0"/>
-            </a:br>
-            <a:r>
-              <a:rPr lang="pl-PL" dirty="0" smtClean="0"/>
-              <a:t>Difference will show up instead of the CURRENT and its transformation (position and zoom) will be the same as transformation of the REFERENCE</a:t>
-            </a:r>
-          </a:p>
-          <a:p>
-            <a:pPr lvl="1"/>
-            <a:r>
-              <a:rPr lang="pl-PL" dirty="0" smtClean="0"/>
-              <a:t>Text: Side by Side or Combined Inline; color legend:</a:t>
-            </a:r>
-          </a:p>
-          <a:p>
-            <a:pPr lvl="2"/>
+              <a:t>Section 3: </a:t>
+            </a:r>
             <a:r>
               <a:rPr lang="pl-PL" b="1" dirty="0" smtClean="0">
                 <a:solidFill>
-                  <a:schemeClr val="accent4">
-                    <a:lumMod val="60000"/>
-                    <a:lumOff val="40000"/>
+                  <a:schemeClr val="accent2">
+                    <a:lumMod val="75000"/>
                   </a:schemeClr>
                 </a:solidFill>
               </a:rPr>
-              <a:t>There is a differnece between the two lines</a:t>
-            </a:r>
-          </a:p>
-          <a:p>
-            <a:pPr lvl="2"/>
+              <a:t>Tab Bar</a:t>
+            </a:r>
+            <a:endParaRPr lang="en-GB" b="1" dirty="0">
+              <a:solidFill>
+                <a:schemeClr val="accent2">
+                  <a:lumMod val="75000"/>
+                </a:schemeClr>
+              </a:solidFill>
+            </a:endParaRPr>
+          </a:p>
+        </p:txBody>
+      </p:sp>
+      <p:sp>
+        <p:nvSpPr>
+          <p:cNvPr id="3" name="Content Placeholder 2"/>
+          <p:cNvSpPr>
+            <a:spLocks noGrp="1"/>
+          </p:cNvSpPr>
+          <p:nvPr>
+            <p:ph idx="1"/>
+          </p:nvPr>
+        </p:nvSpPr>
+        <p:spPr/>
+        <p:txBody>
+          <a:bodyPr/>
+          <a:lstStyle/>
+          <a:p>
+            <a:r>
+              <a:rPr lang="pl-PL" dirty="0" smtClean="0"/>
+              <a:t>Populates when User decides which data to present (using</a:t>
+            </a:r>
             <a:r>
               <a:rPr lang="pl-PL" b="1" dirty="0" smtClean="0">
                 <a:solidFill>
-                  <a:srgbClr val="FF0000"/>
+                  <a:srgbClr val="7030A0"/>
                 </a:solidFill>
               </a:rPr>
-              <a:t>The line does not exist in the CURRENT</a:t>
-            </a:r>
-          </a:p>
-          <a:p>
-            <a:pPr lvl="2"/>
+              <a:t> Options Panel </a:t>
+            </a:r>
             <a:r>
               <a:rPr lang="pl-PL" b="1" dirty="0" smtClean="0">
                 <a:solidFill>
-                  <a:srgbClr val="00B050"/>
+                  <a:srgbClr val="FF99CC"/>
                 </a:solidFill>
               </a:rPr>
-              <a:t>The line does not exist in the REFERENCE</a:t>
-            </a:r>
-          </a:p>
-          <a:p>
-            <a:pPr lvl="2"/>
+              <a:t>Data Picker</a:t>
+            </a:r>
+            <a:r>
+              <a:rPr lang="pl-PL" dirty="0" smtClean="0"/>
+              <a:t>)</a:t>
+            </a:r>
+          </a:p>
+          <a:p>
+            <a:pPr lvl="1"/>
+            <a:r>
+              <a:rPr lang="pl-PL" dirty="0" smtClean="0"/>
+              <a:t>If </a:t>
+            </a:r>
             <a:r>
               <a:rPr lang="pl-PL" b="1" dirty="0" smtClean="0">
                 <a:solidFill>
-                  <a:schemeClr val="bg2">
-                    <a:lumMod val="50000"/>
-                  </a:schemeClr>
+                  <a:schemeClr val="accent2"/>
                 </a:solidFill>
               </a:rPr>
-              <a:t>Placeholder to keep lines in order</a:t>
-            </a:r>
-          </a:p>
-          <a:p>
-            <a:pPr lvl="2"/>
-            <a:endParaRPr lang="en-GB" dirty="0"/>
+              <a:t>Browsing Type </a:t>
+            </a:r>
+            <a:r>
+              <a:rPr lang="pl-PL" dirty="0" smtClean="0"/>
+              <a:t>is changed to Timeline only tabs which present Tracker Maps will be visible (no interactive and text data allowed)</a:t>
+            </a:r>
+            <a:endParaRPr lang="pl-PL" dirty="0" smtClean="0"/>
+          </a:p>
+          <a:p>
+            <a:r>
+              <a:rPr lang="pl-PL" dirty="0" smtClean="0"/>
+              <a:t>Tip: if you decide </a:t>
+            </a:r>
+            <a:r>
+              <a:rPr lang="pl-PL" dirty="0" smtClean="0"/>
+              <a:t>that you </a:t>
+            </a:r>
+            <a:r>
+              <a:rPr lang="pl-PL" dirty="0" smtClean="0"/>
+              <a:t>do not want given dataset (map/log) you can either </a:t>
+            </a:r>
+            <a:endParaRPr lang="pl-PL" dirty="0" smtClean="0"/>
+          </a:p>
+          <a:p>
+            <a:pPr lvl="1"/>
+            <a:r>
+              <a:rPr lang="pl-PL" dirty="0" smtClean="0"/>
+              <a:t>uncheck </a:t>
+            </a:r>
+            <a:r>
+              <a:rPr lang="pl-PL" dirty="0" smtClean="0"/>
+              <a:t>corresponding checkbox on </a:t>
+            </a:r>
+            <a:r>
+              <a:rPr lang="pl-PL" b="1" dirty="0" smtClean="0">
+                <a:solidFill>
+                  <a:srgbClr val="7030A0"/>
+                </a:solidFill>
+              </a:rPr>
+              <a:t>Options Panel </a:t>
+            </a:r>
+            <a:r>
+              <a:rPr lang="pl-PL" dirty="0" smtClean="0"/>
+              <a:t>or </a:t>
+            </a:r>
+            <a:endParaRPr lang="pl-PL" dirty="0" smtClean="0"/>
+          </a:p>
+          <a:p>
+            <a:pPr lvl="1"/>
+            <a:r>
+              <a:rPr lang="pl-PL" dirty="0" smtClean="0"/>
+              <a:t>click close button in the top-right corner of the tab or</a:t>
+            </a:r>
+          </a:p>
+          <a:p>
+            <a:pPr lvl="1"/>
+            <a:r>
+              <a:rPr lang="pl-PL" dirty="0" smtClean="0"/>
+              <a:t>you </a:t>
+            </a:r>
+            <a:r>
+              <a:rPr lang="pl-PL" dirty="0" smtClean="0"/>
+              <a:t>can click </a:t>
+            </a:r>
+            <a:r>
+              <a:rPr lang="pl-PL" u="sng" dirty="0" smtClean="0"/>
+              <a:t>Middle Mouse Button (MMB) </a:t>
+            </a:r>
+            <a:r>
+              <a:rPr lang="pl-PL" dirty="0" smtClean="0"/>
+              <a:t>to remove </a:t>
+            </a:r>
+            <a:r>
+              <a:rPr lang="pl-PL" dirty="0" smtClean="0"/>
+              <a:t>this tab</a:t>
+            </a:r>
+          </a:p>
+          <a:p>
+            <a:pPr marL="0" indent="0">
+              <a:buNone/>
+            </a:pPr>
+            <a:r>
+              <a:rPr lang="pl-PL" dirty="0"/>
+              <a:t> </a:t>
+            </a:r>
+            <a:r>
+              <a:rPr lang="pl-PL" dirty="0" smtClean="0"/>
+              <a:t>  Last two options are</a:t>
+            </a:r>
+            <a:r>
+              <a:rPr lang="pl-PL" dirty="0" smtClean="0"/>
+              <a:t> handy </a:t>
+            </a:r>
+            <a:r>
+              <a:rPr lang="pl-PL" dirty="0" smtClean="0"/>
+              <a:t>with hidden </a:t>
+            </a:r>
+            <a:r>
+              <a:rPr lang="pl-PL" b="1" dirty="0" smtClean="0">
+                <a:solidFill>
+                  <a:srgbClr val="7030A0"/>
+                </a:solidFill>
+              </a:rPr>
+              <a:t>Options Panel</a:t>
+            </a:r>
+            <a:endParaRPr lang="en-GB" b="1" dirty="0">
+              <a:solidFill>
+                <a:srgbClr val="7030A0"/>
+              </a:solidFill>
+            </a:endParaRPr>
           </a:p>
         </p:txBody>
       </p:sp>
@@ -4675,9 +5909,9 @@
           <a:bodyPr/>
           <a:lstStyle/>
           <a:p>
-            <a:fld id="{DF77A2F6-83C1-4CAF-B9D2-2E3242175E61}" type="datetime1">
-              <a:rPr lang="en-GB" smtClean="0"/>
-              <a:t>28/06/2017</a:t>
+            <a:fld id="{277B857D-FD6C-4D89-B784-8041C7DA2E7F}" type="datetime1">
+              <a:rPr lang="en-GB" smtClean="0"/>
+              <a:t>17/07/2017</a:t>
             </a:fld>
             <a:endParaRPr lang="en-GB"/>
           </a:p>
@@ -4702,6 +5936,29 @@
               <a:rPr lang="en-GB" smtClean="0"/>
               <a:t>F. Ilic &amp; P. Jurgielewicz</a:t>
             </a:r>
+            <a:endParaRPr lang="en-GB"/>
+          </a:p>
+        </p:txBody>
+      </p:sp>
+      <p:sp>
+        <p:nvSpPr>
+          <p:cNvPr id="6" name="Slide Number Placeholder 5"/>
+          <p:cNvSpPr>
+            <a:spLocks noGrp="1"/>
+          </p:cNvSpPr>
+          <p:nvPr>
+            <p:ph type="sldNum" sz="quarter" idx="12"/>
+          </p:nvPr>
+        </p:nvSpPr>
+        <p:spPr/>
+        <p:txBody>
+          <a:bodyPr/>
+          <a:lstStyle/>
+          <a:p>
+            <a:fld id="{3524DB9F-9467-4B90-B655-964C21D24326}" type="slidenum">
+              <a:rPr lang="en-GB" smtClean="0"/>
+              <a:t>6</a:t>
+            </a:fld>
             <a:endParaRPr lang="en-GB"/>
           </a:p>
         </p:txBody>
@@ -4709,13 +5966,20 @@
     </p:spTree>
     <p:extLst>
       <p:ext uri="{BB962C8B-B14F-4D97-AF65-F5344CB8AC3E}">
-        <p14:creationId xmlns:p14="http://schemas.microsoft.com/office/powerpoint/2010/main" val="773446022"/>
+        <p14:creationId xmlns:p14="http://schemas.microsoft.com/office/powerpoint/2010/main" val="1862011032"/>
       </p:ext>
     </p:extLst>
   </p:cSld>
   <p:clrMapOvr>
     <a:masterClrMapping/>
   </p:clrMapOvr>
+  <p:timing>
+    <p:tnLst>
+      <p:par>
+        <p:cTn id="1" dur="indefinite" restart="never" nodeType="tmRoot"/>
+      </p:par>
+    </p:tnLst>
+  </p:timing>
 </p:sld>
 </file>
 
@@ -4752,8 +6016,12 @@
           <a:lstStyle/>
           <a:p>
             <a:r>
-              <a:rPr lang="pl-PL" dirty="0" smtClean="0"/>
-              <a:t>Known issues</a:t>
+              <a:rPr lang="pl-PL" dirty="0"/>
+              <a:t>Section 5: </a:t>
+            </a:r>
+            <a:r>
+              <a:rPr lang="pl-PL" b="1" dirty="0"/>
+              <a:t>Comparison Bar</a:t>
             </a:r>
             <a:endParaRPr lang="en-GB" dirty="0"/>
           </a:p>
@@ -4776,50 +6044,121 @@
           <a:p>
             <a:r>
               <a:rPr lang="pl-PL" dirty="0" smtClean="0"/>
-              <a:t>Browsers supported:</a:t>
+              <a:t>Type </a:t>
+            </a:r>
+            <a:r>
+              <a:rPr lang="pl-PL" dirty="0"/>
+              <a:t>of comparison depends on the type of data:</a:t>
             </a:r>
           </a:p>
           <a:p>
             <a:pPr lvl="1"/>
             <a:r>
-              <a:rPr lang="pl-PL" dirty="0" smtClean="0"/>
-              <a:t>Chrome</a:t>
+              <a:rPr lang="pl-PL" dirty="0"/>
+              <a:t>Image: Comparison is done by subtracting values in each pixel: </a:t>
+            </a:r>
+            <a:br>
+              <a:rPr lang="pl-PL" dirty="0"/>
+            </a:br>
+            <a:r>
+              <a:rPr lang="pl-PL" dirty="0"/>
+              <a:t>DIFF = REFERENCE – CURRENT</a:t>
+            </a:r>
+            <a:br>
+              <a:rPr lang="pl-PL" dirty="0"/>
+            </a:br>
+            <a:r>
+              <a:rPr lang="pl-PL" dirty="0"/>
+              <a:t>Difference will show up instead of the CURRENT and its transformation (position and zoom) will be the same as transformation of the REFERENCE</a:t>
             </a:r>
           </a:p>
           <a:p>
             <a:pPr lvl="1"/>
             <a:r>
-              <a:rPr lang="pl-PL" dirty="0" smtClean="0"/>
-              <a:t>Firefox</a:t>
+              <a:rPr lang="pl-PL" dirty="0"/>
+              <a:t>Text: Side by Side or Combined Inline; color legend:</a:t>
+            </a:r>
+          </a:p>
+          <a:p>
+            <a:pPr lvl="2"/>
+            <a:r>
+              <a:rPr lang="pl-PL" b="1" dirty="0">
+                <a:solidFill>
+                  <a:schemeClr val="accent4">
+                    <a:lumMod val="60000"/>
+                    <a:lumOff val="40000"/>
+                  </a:schemeClr>
+                </a:solidFill>
+              </a:rPr>
+              <a:t>There is a differnece between the two lines</a:t>
+            </a:r>
+          </a:p>
+          <a:p>
+            <a:pPr lvl="2"/>
+            <a:r>
+              <a:rPr lang="pl-PL" b="1" dirty="0">
+                <a:solidFill>
+                  <a:srgbClr val="FF0000"/>
+                </a:solidFill>
+              </a:rPr>
+              <a:t>The line does not exist in the CURRENT</a:t>
+            </a:r>
+          </a:p>
+          <a:p>
+            <a:pPr lvl="2"/>
+            <a:r>
+              <a:rPr lang="pl-PL" b="1" dirty="0">
+                <a:solidFill>
+                  <a:srgbClr val="00B050"/>
+                </a:solidFill>
+              </a:rPr>
+              <a:t>The line does not exist in the REFERENCE</a:t>
+            </a:r>
+          </a:p>
+          <a:p>
+            <a:pPr lvl="2"/>
+            <a:r>
+              <a:rPr lang="pl-PL" b="1" dirty="0">
+                <a:solidFill>
+                  <a:schemeClr val="bg2">
+                    <a:lumMod val="50000"/>
+                  </a:schemeClr>
+                </a:solidFill>
+              </a:rPr>
+              <a:t>Placeholder to keep lines in </a:t>
+            </a:r>
+            <a:r>
+              <a:rPr lang="pl-PL" b="1" dirty="0" smtClean="0">
+                <a:solidFill>
+                  <a:schemeClr val="bg2">
+                    <a:lumMod val="50000"/>
+                  </a:schemeClr>
+                </a:solidFill>
+              </a:rPr>
+              <a:t>order</a:t>
             </a:r>
           </a:p>
           <a:p>
             <a:pPr lvl="1"/>
             <a:r>
               <a:rPr lang="pl-PL" dirty="0" smtClean="0"/>
-              <a:t>Safari</a:t>
-            </a:r>
-          </a:p>
-          <a:p>
-            <a:r>
-              <a:rPr lang="pl-PL" dirty="0" smtClean="0"/>
-              <a:t>Browsers </a:t>
-            </a:r>
-            <a:r>
-              <a:rPr lang="pl-PL" b="1" dirty="0" smtClean="0"/>
-              <a:t>NOT</a:t>
-            </a:r>
-            <a:r>
-              <a:rPr lang="pl-PL" dirty="0" smtClean="0"/>
-              <a:t> supported at all:</a:t>
-            </a:r>
-          </a:p>
-          <a:p>
-            <a:pPr lvl="1"/>
-            <a:r>
-              <a:rPr lang="pl-PL" dirty="0" smtClean="0"/>
-              <a:t>IE / Edge</a:t>
-            </a:r>
+              <a:t>Comparisons are not allowed in the Timeline </a:t>
+            </a:r>
+            <a:r>
+              <a:rPr lang="pl-PL" b="1" dirty="0" smtClean="0">
+                <a:solidFill>
+                  <a:schemeClr val="accent2"/>
+                </a:solidFill>
+              </a:rPr>
+              <a:t>Browsing Mode</a:t>
+            </a:r>
+            <a:endParaRPr lang="pl-PL" b="1" dirty="0">
+              <a:solidFill>
+                <a:schemeClr val="accent2"/>
+              </a:solidFill>
+            </a:endParaRPr>
+          </a:p>
+          <a:p>
             <a:endParaRPr lang="en-GB" dirty="0"/>
           </a:p>
         </p:txBody>
@@ -4839,9 +6178,9 @@
           <a:bodyPr/>
           <a:lstStyle/>
           <a:p>
-            <a:fld id="{41524526-4F34-4B12-B9CF-79E5CFEA6D4B}" type="datetime1">
-              <a:rPr lang="en-GB" smtClean="0"/>
-              <a:t>28/06/2017</a:t>
+            <a:fld id="{48C27299-CEE3-4B8F-837E-F4DBB9C48A7D}" type="datetime1">
+              <a:rPr lang="en-GB" smtClean="0"/>
+              <a:t>17/07/2017</a:t>
             </a:fld>
             <a:endParaRPr lang="en-GB"/>
           </a:p>
@@ -4866,6 +6205,29 @@
               <a:rPr lang="en-GB" smtClean="0"/>
               <a:t>F. Ilic &amp; P. Jurgielewicz</a:t>
             </a:r>
+            <a:endParaRPr lang="en-GB"/>
+          </a:p>
+        </p:txBody>
+      </p:sp>
+      <p:sp>
+        <p:nvSpPr>
+          <p:cNvPr id="6" name="Slide Number Placeholder 5"/>
+          <p:cNvSpPr>
+            <a:spLocks noGrp="1"/>
+          </p:cNvSpPr>
+          <p:nvPr>
+            <p:ph type="sldNum" sz="quarter" idx="12"/>
+          </p:nvPr>
+        </p:nvSpPr>
+        <p:spPr/>
+        <p:txBody>
+          <a:bodyPr/>
+          <a:lstStyle/>
+          <a:p>
+            <a:fld id="{3524DB9F-9467-4B90-B655-964C21D24326}" type="slidenum">
+              <a:rPr lang="en-GB" smtClean="0"/>
+              <a:t>7</a:t>
+            </a:fld>
             <a:endParaRPr lang="en-GB"/>
           </a:p>
         </p:txBody>
@@ -4873,13 +6235,538 @@
     </p:spTree>
     <p:extLst>
       <p:ext uri="{BB962C8B-B14F-4D97-AF65-F5344CB8AC3E}">
-        <p14:creationId xmlns:p14="http://schemas.microsoft.com/office/powerpoint/2010/main" val="3114844675"/>
+        <p14:creationId xmlns:p14="http://schemas.microsoft.com/office/powerpoint/2010/main" val="2606989065"/>
       </p:ext>
     </p:extLst>
   </p:cSld>
   <p:clrMapOvr>
     <a:masterClrMapping/>
   </p:clrMapOvr>
+  <p:timing>
+    <p:tnLst>
+      <p:par>
+        <p:cTn id="1" dur="indefinite" restart="never" nodeType="tmRoot"/>
+      </p:par>
+    </p:tnLst>
+  </p:timing>
+</p:sld>
+</file>
+
+<file path=ppt/slides/slide8.xml><?xml version="1.0" encoding="utf-8"?>
+<p:sld xmlns:a="http://schemas.openxmlformats.org/drawingml/2006/main" xmlns:r="http://schemas.openxmlformats.org/officeDocument/2006/relationships" xmlns:p="http://schemas.openxmlformats.org/presentationml/2006/main">
+  <p:cSld>
+    <p:spTree>
+      <p:nvGrpSpPr>
+        <p:cNvPr id="1" name=""/>
+        <p:cNvGrpSpPr/>
+        <p:nvPr/>
+      </p:nvGrpSpPr>
+      <p:grpSpPr>
+        <a:xfrm>
+          <a:off x="0" y="0"/>
+          <a:ext cx="0" cy="0"/>
+          <a:chOff x="0" y="0"/>
+          <a:chExt cx="0" cy="0"/>
+        </a:xfrm>
+      </p:grpSpPr>
+      <p:sp>
+        <p:nvSpPr>
+          <p:cNvPr id="2" name="Title 1"/>
+          <p:cNvSpPr>
+            <a:spLocks noGrp="1"/>
+          </p:cNvSpPr>
+          <p:nvPr>
+            <p:ph type="title"/>
+          </p:nvPr>
+        </p:nvSpPr>
+        <p:spPr/>
+        <p:txBody>
+          <a:bodyPr/>
+          <a:lstStyle/>
+          <a:p>
+            <a:r>
+              <a:rPr lang="pl-PL" dirty="0" smtClean="0"/>
+              <a:t>Section </a:t>
+            </a:r>
+            <a:r>
+              <a:rPr lang="pl-PL" dirty="0" smtClean="0"/>
+              <a:t>4A: </a:t>
+            </a:r>
+            <a:r>
+              <a:rPr lang="pl-PL" b="1" dirty="0" smtClean="0">
+                <a:solidFill>
+                  <a:schemeClr val="accent6"/>
+                </a:solidFill>
+              </a:rPr>
+              <a:t>Data </a:t>
+            </a:r>
+            <a:r>
+              <a:rPr lang="pl-PL" b="1" dirty="0" smtClean="0">
+                <a:solidFill>
+                  <a:schemeClr val="accent6"/>
+                </a:solidFill>
+              </a:rPr>
+              <a:t>Show: Comparison</a:t>
+            </a:r>
+            <a:endParaRPr lang="en-GB" b="1" dirty="0">
+              <a:solidFill>
+                <a:schemeClr val="accent6"/>
+              </a:solidFill>
+            </a:endParaRPr>
+          </a:p>
+        </p:txBody>
+      </p:sp>
+      <p:sp>
+        <p:nvSpPr>
+          <p:cNvPr id="3" name="Content Placeholder 2"/>
+          <p:cNvSpPr>
+            <a:spLocks noGrp="1"/>
+          </p:cNvSpPr>
+          <p:nvPr>
+            <p:ph idx="1"/>
+          </p:nvPr>
+        </p:nvSpPr>
+        <p:spPr/>
+        <p:txBody>
+          <a:bodyPr/>
+          <a:lstStyle/>
+          <a:p>
+            <a:r>
+              <a:rPr lang="pl-PL" dirty="0" smtClean="0"/>
+              <a:t>Presents data for currently chosen dataset in </a:t>
+            </a:r>
+            <a:r>
+              <a:rPr lang="pl-PL" b="1" dirty="0" smtClean="0">
+                <a:solidFill>
+                  <a:schemeClr val="accent2">
+                    <a:lumMod val="75000"/>
+                  </a:schemeClr>
+                </a:solidFill>
+              </a:rPr>
+              <a:t>Tab Bar </a:t>
+            </a:r>
+            <a:r>
+              <a:rPr lang="pl-PL" dirty="0" smtClean="0"/>
+              <a:t>with REFERENCE Run on the left and CURRENT on the right</a:t>
+            </a:r>
+          </a:p>
+          <a:p>
+            <a:r>
+              <a:rPr lang="pl-PL" dirty="0" smtClean="0"/>
+              <a:t>Data can be either Images or Text:</a:t>
+            </a:r>
+          </a:p>
+          <a:p>
+            <a:pPr lvl="1"/>
+            <a:r>
+              <a:rPr lang="pl-PL" dirty="0" smtClean="0"/>
+              <a:t>Images: they allow for panning(dragging) </a:t>
+            </a:r>
+            <a:r>
+              <a:rPr lang="pl-PL" dirty="0" smtClean="0"/>
+              <a:t>&amp; </a:t>
+            </a:r>
+            <a:r>
+              <a:rPr lang="pl-PL" dirty="0" smtClean="0"/>
+              <a:t>zooming with your </a:t>
+            </a:r>
+            <a:r>
+              <a:rPr lang="pl-PL" u="sng" dirty="0" smtClean="0"/>
+              <a:t>Mouse</a:t>
+            </a:r>
+            <a:r>
+              <a:rPr lang="pl-PL" dirty="0" smtClean="0"/>
+              <a:t> and its </a:t>
+            </a:r>
+            <a:r>
+              <a:rPr lang="pl-PL" u="sng" dirty="0" smtClean="0"/>
+              <a:t>Scroll,</a:t>
+            </a:r>
+            <a:r>
+              <a:rPr lang="pl-PL" dirty="0" smtClean="0"/>
+              <a:t> keeping the same transformation in both views</a:t>
+            </a:r>
+          </a:p>
+          <a:p>
+            <a:pPr lvl="1"/>
+            <a:r>
+              <a:rPr lang="pl-PL" dirty="0" smtClean="0"/>
+              <a:t>Text files </a:t>
+            </a:r>
+          </a:p>
+          <a:p>
+            <a:r>
+              <a:rPr lang="pl-PL" dirty="0" smtClean="0"/>
+              <a:t>Both forms allow to make comparison views using </a:t>
+            </a:r>
+            <a:r>
+              <a:rPr lang="pl-PL" b="1" dirty="0" smtClean="0"/>
+              <a:t>Comparison Bar</a:t>
+            </a:r>
+            <a:endParaRPr lang="en-GB" b="1" dirty="0"/>
+          </a:p>
+        </p:txBody>
+      </p:sp>
+      <p:sp>
+        <p:nvSpPr>
+          <p:cNvPr id="4" name="Date Placeholder 3"/>
+          <p:cNvSpPr>
+            <a:spLocks noGrp="1"/>
+          </p:cNvSpPr>
+          <p:nvPr>
+            <p:ph type="dt" sz="half" idx="10"/>
+          </p:nvPr>
+        </p:nvSpPr>
+        <p:spPr/>
+        <p:txBody>
+          <a:bodyPr/>
+          <a:lstStyle/>
+          <a:p>
+            <a:fld id="{8B1429E9-75C2-4D2C-B8E9-FF6F8808264A}" type="datetime1">
+              <a:rPr lang="en-GB" smtClean="0"/>
+              <a:t>17/07/2017</a:t>
+            </a:fld>
+            <a:endParaRPr lang="en-GB"/>
+          </a:p>
+        </p:txBody>
+      </p:sp>
+      <p:sp>
+        <p:nvSpPr>
+          <p:cNvPr id="5" name="Footer Placeholder 4"/>
+          <p:cNvSpPr>
+            <a:spLocks noGrp="1"/>
+          </p:cNvSpPr>
+          <p:nvPr>
+            <p:ph type="ftr" sz="quarter" idx="11"/>
+          </p:nvPr>
+        </p:nvSpPr>
+        <p:spPr/>
+        <p:txBody>
+          <a:bodyPr/>
+          <a:lstStyle/>
+          <a:p>
+            <a:r>
+              <a:rPr lang="en-GB" smtClean="0"/>
+              <a:t>F. Ilic &amp; P. Jurgielewicz</a:t>
+            </a:r>
+            <a:endParaRPr lang="en-GB"/>
+          </a:p>
+        </p:txBody>
+      </p:sp>
+      <p:sp>
+        <p:nvSpPr>
+          <p:cNvPr id="6" name="Slide Number Placeholder 5"/>
+          <p:cNvSpPr>
+            <a:spLocks noGrp="1"/>
+          </p:cNvSpPr>
+          <p:nvPr>
+            <p:ph type="sldNum" sz="quarter" idx="12"/>
+          </p:nvPr>
+        </p:nvSpPr>
+        <p:spPr/>
+        <p:txBody>
+          <a:bodyPr/>
+          <a:lstStyle/>
+          <a:p>
+            <a:fld id="{3524DB9F-9467-4B90-B655-964C21D24326}" type="slidenum">
+              <a:rPr lang="en-GB" smtClean="0"/>
+              <a:t>8</a:t>
+            </a:fld>
+            <a:endParaRPr lang="en-GB"/>
+          </a:p>
+        </p:txBody>
+      </p:sp>
+    </p:spTree>
+    <p:extLst>
+      <p:ext uri="{BB962C8B-B14F-4D97-AF65-F5344CB8AC3E}">
+        <p14:creationId xmlns:p14="http://schemas.microsoft.com/office/powerpoint/2010/main" val="3887732259"/>
+      </p:ext>
+    </p:extLst>
+  </p:cSld>
+  <p:clrMapOvr>
+    <a:masterClrMapping/>
+  </p:clrMapOvr>
+  <p:timing>
+    <p:tnLst>
+      <p:par>
+        <p:cTn id="1" dur="indefinite" restart="never" nodeType="tmRoot"/>
+      </p:par>
+    </p:tnLst>
+  </p:timing>
+</p:sld>
+</file>
+
+<file path=ppt/slides/slide9.xml><?xml version="1.0" encoding="utf-8"?>
+<p:sld xmlns:a="http://schemas.openxmlformats.org/drawingml/2006/main" xmlns:r="http://schemas.openxmlformats.org/officeDocument/2006/relationships" xmlns:p="http://schemas.openxmlformats.org/presentationml/2006/main">
+  <p:cSld>
+    <p:spTree>
+      <p:nvGrpSpPr>
+        <p:cNvPr id="1" name=""/>
+        <p:cNvGrpSpPr/>
+        <p:nvPr/>
+      </p:nvGrpSpPr>
+      <p:grpSpPr>
+        <a:xfrm>
+          <a:off x="0" y="0"/>
+          <a:ext cx="0" cy="0"/>
+          <a:chOff x="0" y="0"/>
+          <a:chExt cx="0" cy="0"/>
+        </a:xfrm>
+      </p:grpSpPr>
+      <p:sp>
+        <p:nvSpPr>
+          <p:cNvPr id="2" name="Title 1"/>
+          <p:cNvSpPr>
+            <a:spLocks noGrp="1"/>
+          </p:cNvSpPr>
+          <p:nvPr>
+            <p:ph type="title"/>
+          </p:nvPr>
+        </p:nvSpPr>
+        <p:spPr/>
+        <p:txBody>
+          <a:bodyPr/>
+          <a:lstStyle/>
+          <a:p>
+            <a:r>
+              <a:rPr lang="pl-PL" dirty="0"/>
+              <a:t>Section 4: </a:t>
+            </a:r>
+            <a:r>
+              <a:rPr lang="pl-PL" b="1" dirty="0">
+                <a:solidFill>
+                  <a:schemeClr val="accent6"/>
+                </a:solidFill>
+              </a:rPr>
+              <a:t>Data Show: </a:t>
+            </a:r>
+            <a:r>
+              <a:rPr lang="pl-PL" b="1" dirty="0" smtClean="0">
+                <a:solidFill>
+                  <a:schemeClr val="accent6"/>
+                </a:solidFill>
+              </a:rPr>
+              <a:t>Comparison contd</a:t>
+            </a:r>
+            <a:endParaRPr lang="en-GB" dirty="0"/>
+          </a:p>
+        </p:txBody>
+      </p:sp>
+      <p:sp>
+        <p:nvSpPr>
+          <p:cNvPr id="3" name="Content Placeholder 2"/>
+          <p:cNvSpPr>
+            <a:spLocks noGrp="1"/>
+          </p:cNvSpPr>
+          <p:nvPr>
+            <p:ph idx="1"/>
+          </p:nvPr>
+        </p:nvSpPr>
+        <p:spPr/>
+        <p:txBody>
+          <a:bodyPr/>
+          <a:lstStyle/>
+          <a:p>
+            <a:r>
+              <a:rPr lang="pl-PL" dirty="0" smtClean="0"/>
+              <a:t>There is a special type of Tracker Maps – Interactive Tracker Maps	</a:t>
+            </a:r>
+          </a:p>
+          <a:p>
+            <a:pPr lvl="1"/>
+            <a:r>
+              <a:rPr lang="en-GB" dirty="0"/>
+              <a:t>Quality tests - FED view: interactive </a:t>
+            </a:r>
+            <a:endParaRPr lang="pl-PL" dirty="0" smtClean="0"/>
+          </a:p>
+          <a:p>
+            <a:pPr lvl="1"/>
+            <a:r>
+              <a:rPr lang="en-GB" dirty="0"/>
+              <a:t>Quality tests - PSU view: </a:t>
+            </a:r>
+            <a:r>
+              <a:rPr lang="en-GB" dirty="0" smtClean="0"/>
+              <a:t>interactive</a:t>
+            </a:r>
+            <a:endParaRPr lang="pl-PL" dirty="0" smtClean="0"/>
+          </a:p>
+          <a:p>
+            <a:r>
+              <a:rPr lang="pl-PL" dirty="0" smtClean="0"/>
+              <a:t>The main difference between them and regular Tracker Maps is that when you hover over visible module:</a:t>
+            </a:r>
+          </a:p>
+          <a:p>
+            <a:pPr lvl="1"/>
+            <a:r>
+              <a:rPr lang="pl-PL" dirty="0" smtClean="0"/>
+              <a:t>you are informed about the current module name in the tooltip</a:t>
+            </a:r>
+          </a:p>
+          <a:p>
+            <a:pPr lvl="1"/>
+            <a:r>
+              <a:rPr lang="pl-PL" dirty="0" smtClean="0"/>
+              <a:t>the module gets </a:t>
+            </a:r>
+            <a:r>
+              <a:rPr lang="pl-PL" dirty="0" smtClean="0">
+                <a:solidFill>
+                  <a:schemeClr val="accent2">
+                    <a:lumMod val="60000"/>
+                    <a:lumOff val="40000"/>
+                  </a:schemeClr>
+                </a:solidFill>
+              </a:rPr>
+              <a:t>orange</a:t>
+            </a:r>
+            <a:r>
+              <a:rPr lang="pl-PL" dirty="0" smtClean="0"/>
+              <a:t> highlight</a:t>
+            </a:r>
+          </a:p>
+          <a:p>
+            <a:pPr lvl="1"/>
+            <a:r>
+              <a:rPr lang="pl-PL" dirty="0"/>
+              <a:t>c</a:t>
+            </a:r>
+            <a:r>
+              <a:rPr lang="pl-PL" dirty="0" smtClean="0"/>
+              <a:t>licking (LMB) on the module sets it in the metastable state</a:t>
+            </a:r>
+          </a:p>
+          <a:p>
+            <a:pPr lvl="2"/>
+            <a:r>
+              <a:rPr lang="pl-PL" dirty="0" smtClean="0"/>
+              <a:t>highlight changes to </a:t>
+            </a:r>
+            <a:r>
+              <a:rPr lang="pl-PL" dirty="0" smtClean="0">
+                <a:solidFill>
+                  <a:srgbClr val="92D050"/>
+                </a:solidFill>
+              </a:rPr>
+              <a:t>green</a:t>
+            </a:r>
+            <a:r>
+              <a:rPr lang="pl-PL" dirty="0" smtClean="0"/>
+              <a:t> </a:t>
+            </a:r>
+          </a:p>
+          <a:p>
+            <a:pPr lvl="2"/>
+            <a:r>
+              <a:rPr lang="pl-PL" dirty="0"/>
+              <a:t>t</a:t>
+            </a:r>
+            <a:r>
+              <a:rPr lang="pl-PL" dirty="0" smtClean="0"/>
+              <a:t>ooltip is not hiding</a:t>
+            </a:r>
+          </a:p>
+          <a:p>
+            <a:pPr lvl="3"/>
+            <a:r>
+              <a:rPr lang="pl-PL" dirty="0" smtClean="0"/>
+              <a:t>However tooltip is hidden when zooming and clicking MMB on the Tracker Map</a:t>
+            </a:r>
+          </a:p>
+          <a:p>
+            <a:pPr lvl="1"/>
+            <a:endParaRPr lang="en-GB" dirty="0"/>
+          </a:p>
+        </p:txBody>
+      </p:sp>
+      <p:sp>
+        <p:nvSpPr>
+          <p:cNvPr id="4" name="Date Placeholder 3"/>
+          <p:cNvSpPr>
+            <a:spLocks noGrp="1"/>
+          </p:cNvSpPr>
+          <p:nvPr>
+            <p:ph type="dt" sz="half" idx="10"/>
+          </p:nvPr>
+        </p:nvSpPr>
+        <p:spPr/>
+        <p:txBody>
+          <a:bodyPr/>
+          <a:lstStyle/>
+          <a:p>
+            <a:fld id="{30CCC893-4F25-4336-82DA-7472B157839F}" type="datetime1">
+              <a:rPr lang="en-GB" smtClean="0"/>
+              <a:t>17/07/2017</a:t>
+            </a:fld>
+            <a:endParaRPr lang="en-GB"/>
+          </a:p>
+        </p:txBody>
+      </p:sp>
+      <p:sp>
+        <p:nvSpPr>
+          <p:cNvPr id="5" name="Footer Placeholder 4"/>
+          <p:cNvSpPr>
+            <a:spLocks noGrp="1"/>
+          </p:cNvSpPr>
+          <p:nvPr>
+            <p:ph type="ftr" sz="quarter" idx="11"/>
+          </p:nvPr>
+        </p:nvSpPr>
+        <p:spPr/>
+        <p:txBody>
+          <a:bodyPr/>
+          <a:lstStyle/>
+          <a:p>
+            <a:r>
+              <a:rPr lang="en-GB" smtClean="0"/>
+              <a:t>F. Ilic &amp; P. Jurgielewicz</a:t>
+            </a:r>
+            <a:endParaRPr lang="en-GB"/>
+          </a:p>
+        </p:txBody>
+      </p:sp>
+      <p:sp>
+        <p:nvSpPr>
+          <p:cNvPr id="6" name="Slide Number Placeholder 5"/>
+          <p:cNvSpPr>
+            <a:spLocks noGrp="1"/>
+          </p:cNvSpPr>
+          <p:nvPr>
+            <p:ph type="sldNum" sz="quarter" idx="12"/>
+          </p:nvPr>
+        </p:nvSpPr>
+        <p:spPr/>
+        <p:txBody>
+          <a:bodyPr/>
+          <a:lstStyle/>
+          <a:p>
+            <a:fld id="{3524DB9F-9467-4B90-B655-964C21D24326}" type="slidenum">
+              <a:rPr lang="en-GB" smtClean="0"/>
+              <a:t>9</a:t>
+            </a:fld>
+            <a:endParaRPr lang="en-GB"/>
+          </a:p>
+        </p:txBody>
+      </p:sp>
+    </p:spTree>
+    <p:extLst>
+      <p:ext uri="{BB962C8B-B14F-4D97-AF65-F5344CB8AC3E}">
+        <p14:creationId xmlns:p14="http://schemas.microsoft.com/office/powerpoint/2010/main" val="3829287450"/>
+      </p:ext>
+    </p:extLst>
+  </p:cSld>
+  <p:clrMapOvr>
+    <a:masterClrMapping/>
+  </p:clrMapOvr>
+  <p:timing>
+    <p:tnLst>
+      <p:par>
+        <p:cTn id="1" dur="indefinite" restart="never" nodeType="tmRoot"/>
+      </p:par>
+    </p:tnLst>
+  </p:timing>
 </p:sld>
 </file>
 

</xml_diff>

<commit_message>
resize/fullscreen handling finalized,small changes to style
</commit_message>
<xml_diff>
--- a/doc/tkmap_manual.pptx
+++ b/doc/tkmap_manual.pptx
@@ -209,7 +209,7 @@
           <a:p>
             <a:fld id="{24700429-BAA8-41ED-9533-5A8E557B96BB}" type="datetimeFigureOut">
               <a:rPr lang="en-GB" smtClean="0"/>
-              <a:t>17/07/2017</a:t>
+              <a:t>19/07/2017</a:t>
             </a:fld>
             <a:endParaRPr lang="en-GB"/>
           </a:p>
@@ -608,7 +608,7 @@
           <a:p>
             <a:fld id="{664C6515-DE4E-4440-815F-C18228E69121}" type="datetime1">
               <a:rPr lang="en-GB" smtClean="0"/>
-              <a:t>17/07/2017</a:t>
+              <a:t>19/07/2017</a:t>
             </a:fld>
             <a:endParaRPr lang="en-GB"/>
           </a:p>
@@ -782,7 +782,7 @@
           <a:p>
             <a:fld id="{FD2991BD-04A1-4267-B4D7-E39E3FAD24FE}" type="datetime1">
               <a:rPr lang="en-GB" smtClean="0"/>
-              <a:t>17/07/2017</a:t>
+              <a:t>19/07/2017</a:t>
             </a:fld>
             <a:endParaRPr lang="en-GB"/>
           </a:p>
@@ -966,7 +966,7 @@
           <a:p>
             <a:fld id="{D53067C1-1BF2-45E4-A043-01D021BC2E2C}" type="datetime1">
               <a:rPr lang="en-GB" smtClean="0"/>
-              <a:t>17/07/2017</a:t>
+              <a:t>19/07/2017</a:t>
             </a:fld>
             <a:endParaRPr lang="en-GB"/>
           </a:p>
@@ -1140,7 +1140,7 @@
           <a:p>
             <a:fld id="{C02B2954-C6F9-497A-8798-9CCADDC45FD1}" type="datetime1">
               <a:rPr lang="en-GB" smtClean="0"/>
-              <a:t>17/07/2017</a:t>
+              <a:t>19/07/2017</a:t>
             </a:fld>
             <a:endParaRPr lang="en-GB"/>
           </a:p>
@@ -1390,7 +1390,7 @@
           <a:p>
             <a:fld id="{A1711311-B7FD-48F0-8F55-D0355609D2B7}" type="datetime1">
               <a:rPr lang="en-GB" smtClean="0"/>
-              <a:t>17/07/2017</a:t>
+              <a:t>19/07/2017</a:t>
             </a:fld>
             <a:endParaRPr lang="en-GB"/>
           </a:p>
@@ -1626,7 +1626,7 @@
           <a:p>
             <a:fld id="{32B0CF09-AD03-4316-8C2B-BBAB6C8E8B24}" type="datetime1">
               <a:rPr lang="en-GB" smtClean="0"/>
-              <a:t>17/07/2017</a:t>
+              <a:t>19/07/2017</a:t>
             </a:fld>
             <a:endParaRPr lang="en-GB"/>
           </a:p>
@@ -1997,7 +1997,7 @@
           <a:p>
             <a:fld id="{62C1F300-96F1-4845-94B9-274E0A630B7C}" type="datetime1">
               <a:rPr lang="en-GB" smtClean="0"/>
-              <a:t>17/07/2017</a:t>
+              <a:t>19/07/2017</a:t>
             </a:fld>
             <a:endParaRPr lang="en-GB"/>
           </a:p>
@@ -2119,7 +2119,7 @@
           <a:p>
             <a:fld id="{68257B03-CE89-4D16-9B22-D729AFBC1F49}" type="datetime1">
               <a:rPr lang="en-GB" smtClean="0"/>
-              <a:t>17/07/2017</a:t>
+              <a:t>19/07/2017</a:t>
             </a:fld>
             <a:endParaRPr lang="en-GB"/>
           </a:p>
@@ -2218,7 +2218,7 @@
           <a:p>
             <a:fld id="{4E3BD542-2018-4650-90A2-E3456B2E2AF1}" type="datetime1">
               <a:rPr lang="en-GB" smtClean="0"/>
-              <a:t>17/07/2017</a:t>
+              <a:t>19/07/2017</a:t>
             </a:fld>
             <a:endParaRPr lang="en-GB"/>
           </a:p>
@@ -2499,7 +2499,7 @@
           <a:p>
             <a:fld id="{87A725B3-8047-4F42-AFD8-03C410D15BAB}" type="datetime1">
               <a:rPr lang="en-GB" smtClean="0"/>
-              <a:t>17/07/2017</a:t>
+              <a:t>19/07/2017</a:t>
             </a:fld>
             <a:endParaRPr lang="en-GB"/>
           </a:p>
@@ -2756,7 +2756,7 @@
           <a:p>
             <a:fld id="{A72DBA1A-9DBE-4E56-9BF5-951C930A2D8C}" type="datetime1">
               <a:rPr lang="en-GB" smtClean="0"/>
-              <a:t>17/07/2017</a:t>
+              <a:t>19/07/2017</a:t>
             </a:fld>
             <a:endParaRPr lang="en-GB"/>
           </a:p>
@@ -2973,7 +2973,7 @@
           <a:p>
             <a:fld id="{656CDA0C-48B7-4E67-8B2F-98E837E87DD5}" type="datetime1">
               <a:rPr lang="en-GB" smtClean="0"/>
-              <a:t>17/07/2017</a:t>
+              <a:t>19/07/2017</a:t>
             </a:fld>
             <a:endParaRPr lang="en-GB"/>
           </a:p>
@@ -3400,7 +3400,7 @@
           <a:p>
             <a:fld id="{A145A019-E5B4-498F-8F1C-65F2F9A32915}" type="datetime1">
               <a:rPr lang="en-GB" smtClean="0"/>
-              <a:t>17/07/2017</a:t>
+              <a:t>19/07/2017</a:t>
             </a:fld>
             <a:endParaRPr lang="en-GB"/>
           </a:p>
@@ -3425,13 +3425,36 @@
               <a:rPr lang="en-GB" smtClean="0"/>
               <a:t>F. Ilic &amp; P. Jurgielewicz</a:t>
             </a:r>
+            <a:endParaRPr lang="en-GB"/>
+          </a:p>
+        </p:txBody>
+      </p:sp>
+      <p:sp>
+        <p:nvSpPr>
+          <p:cNvPr id="9" name="Slide Number Placeholder 8"/>
+          <p:cNvSpPr>
+            <a:spLocks noGrp="1"/>
+          </p:cNvSpPr>
+          <p:nvPr>
+            <p:ph type="sldNum" sz="quarter" idx="12"/>
+          </p:nvPr>
+        </p:nvSpPr>
+        <p:spPr/>
+        <p:txBody>
+          <a:bodyPr/>
+          <a:lstStyle/>
+          <a:p>
+            <a:fld id="{3524DB9F-9467-4B90-B655-964C21D24326}" type="slidenum">
+              <a:rPr lang="en-GB" smtClean="0"/>
+              <a:t>1</a:t>
+            </a:fld>
             <a:endParaRPr lang="en-GB"/>
           </a:p>
         </p:txBody>
       </p:sp>
       <p:pic>
         <p:nvPicPr>
-          <p:cNvPr id="3" name="Picture 2"/>
+          <p:cNvPr id="2" name="Picture 1"/>
           <p:cNvPicPr>
             <a:picLocks noChangeAspect="1"/>
           </p:cNvPicPr>
@@ -3451,37 +3474,14 @@
         </p:blipFill>
         <p:spPr>
           <a:xfrm>
-            <a:off x="0" y="12700"/>
-            <a:ext cx="12192000" cy="6832600"/>
+            <a:off x="415516" y="0"/>
+            <a:ext cx="11360967" cy="6858000"/>
           </a:xfrm>
           <a:prstGeom prst="rect">
             <a:avLst/>
           </a:prstGeom>
         </p:spPr>
       </p:pic>
-      <p:sp>
-        <p:nvSpPr>
-          <p:cNvPr id="9" name="Slide Number Placeholder 8"/>
-          <p:cNvSpPr>
-            <a:spLocks noGrp="1"/>
-          </p:cNvSpPr>
-          <p:nvPr>
-            <p:ph type="sldNum" sz="quarter" idx="12"/>
-          </p:nvPr>
-        </p:nvSpPr>
-        <p:spPr/>
-        <p:txBody>
-          <a:bodyPr/>
-          <a:lstStyle/>
-          <a:p>
-            <a:fld id="{3524DB9F-9467-4B90-B655-964C21D24326}" type="slidenum">
-              <a:rPr lang="en-GB" smtClean="0"/>
-              <a:t>1</a:t>
-            </a:fld>
-            <a:endParaRPr lang="en-GB"/>
-          </a:p>
-        </p:txBody>
-      </p:sp>
     </p:spTree>
     <p:extLst>
       <p:ext uri="{BB962C8B-B14F-4D97-AF65-F5344CB8AC3E}">
@@ -3536,7 +3536,11 @@
           <a:p>
             <a:r>
               <a:rPr lang="pl-PL" dirty="0"/>
-              <a:t>Section 4: </a:t>
+              <a:t>Section </a:t>
+            </a:r>
+            <a:r>
+              <a:rPr lang="pl-PL" dirty="0" smtClean="0"/>
+              <a:t>5A: </a:t>
             </a:r>
             <a:r>
               <a:rPr lang="pl-PL" b="1" dirty="0">
@@ -3604,7 +3608,7 @@
           <a:p>
             <a:fld id="{AEC949DE-A688-4A5D-B675-0E0818EB90A5}" type="datetime1">
               <a:rPr lang="en-GB" smtClean="0"/>
-              <a:t>17/07/2017</a:t>
+              <a:t>19/07/2017</a:t>
             </a:fld>
             <a:endParaRPr lang="en-GB"/>
           </a:p>
@@ -3765,8 +3769,16 @@
               <a:t>Section </a:t>
             </a:r>
             <a:r>
-              <a:rPr lang="pl-PL" dirty="0" smtClean="0"/>
-              <a:t>4B: </a:t>
+              <a:rPr lang="pl-PL" dirty="0"/>
+              <a:t>5</a:t>
+            </a:r>
+            <a:r>
+              <a:rPr lang="pl-PL" dirty="0" smtClean="0"/>
+              <a:t>B</a:t>
+            </a:r>
+            <a:r>
+              <a:rPr lang="pl-PL" dirty="0" smtClean="0"/>
+              <a:t>: </a:t>
             </a:r>
             <a:r>
               <a:rPr lang="pl-PL" b="1" dirty="0">
@@ -3834,7 +3846,7 @@
           <a:p>
             <a:fld id="{C02B2954-C6F9-497A-8798-9CCADDC45FD1}" type="datetime1">
               <a:rPr lang="en-GB" smtClean="0"/>
-              <a:t>17/07/2017</a:t>
+              <a:t>19/07/2017</a:t>
             </a:fld>
             <a:endParaRPr lang="en-GB"/>
           </a:p>
@@ -4080,7 +4092,15 @@
           <a:p>
             <a:r>
               <a:rPr lang="pl-PL" dirty="0"/>
-              <a:t>Section 4B: </a:t>
+              <a:t>Section </a:t>
+            </a:r>
+            <a:r>
+              <a:rPr lang="pl-PL" dirty="0" smtClean="0"/>
+              <a:t>5B</a:t>
+            </a:r>
+            <a:r>
+              <a:rPr lang="pl-PL" dirty="0"/>
+              <a:t>: </a:t>
             </a:r>
             <a:r>
               <a:rPr lang="pl-PL" b="1" dirty="0">
@@ -4212,7 +4232,7 @@
           <a:p>
             <a:fld id="{C02B2954-C6F9-497A-8798-9CCADDC45FD1}" type="datetime1">
               <a:rPr lang="en-GB" smtClean="0"/>
-              <a:t>17/07/2017</a:t>
+              <a:t>19/07/2017</a:t>
             </a:fld>
             <a:endParaRPr lang="en-GB"/>
           </a:p>
@@ -4385,11 +4405,7 @@
             <a:pPr lvl="1"/>
             <a:r>
               <a:rPr lang="pl-PL" dirty="0" smtClean="0"/>
-              <a:t>IE / </a:t>
-            </a:r>
-            <a:r>
-              <a:rPr lang="pl-PL" dirty="0" smtClean="0"/>
-              <a:t>Edge</a:t>
+              <a:t>IE / Edge</a:t>
             </a:r>
           </a:p>
           <a:p>
@@ -4446,7 +4462,7 @@
           <a:p>
             <a:fld id="{ECC89270-5FA8-454F-BFC3-22A3CF1F8103}" type="datetime1">
               <a:rPr lang="en-GB" smtClean="0"/>
-              <a:t>17/07/2017</a:t>
+              <a:t>19/07/2017</a:t>
             </a:fld>
             <a:endParaRPr lang="en-GB"/>
           </a:p>
@@ -4587,11 +4603,7 @@
           <a:p>
             <a:r>
               <a:rPr lang="pl-PL" dirty="0" smtClean="0"/>
-              <a:t>Link </a:t>
-            </a:r>
-            <a:r>
-              <a:rPr lang="pl-PL" dirty="0" smtClean="0"/>
-              <a:t>Me: save current View (contents of </a:t>
+              <a:t>Link Me: save current View (contents of </a:t>
             </a:r>
             <a:r>
               <a:rPr lang="pl-PL" b="1" dirty="0" smtClean="0">
@@ -4599,15 +4611,7 @@
                   <a:srgbClr val="7030A0"/>
                 </a:solidFill>
               </a:rPr>
-              <a:t>Options </a:t>
-            </a:r>
-            <a:r>
-              <a:rPr lang="pl-PL" b="1" dirty="0" smtClean="0">
-                <a:solidFill>
-                  <a:srgbClr val="7030A0"/>
-                </a:solidFill>
-              </a:rPr>
-              <a:t>Panel</a:t>
+              <a:t>Options Panel</a:t>
             </a:r>
             <a:r>
               <a:rPr lang="pl-PL" dirty="0" smtClean="0">
@@ -4675,15 +4679,7 @@
           <a:p>
             <a:r>
               <a:rPr lang="pl-PL" dirty="0" smtClean="0"/>
-              <a:t>Bug, comment, suggestion?: send </a:t>
-            </a:r>
-            <a:r>
-              <a:rPr lang="pl-PL" dirty="0" smtClean="0"/>
-              <a:t>an email </a:t>
-            </a:r>
-            <a:r>
-              <a:rPr lang="pl-PL" dirty="0" smtClean="0"/>
-              <a:t>to the authors</a:t>
+              <a:t>Bug, comment, suggestion?: send an email to the authors</a:t>
             </a:r>
           </a:p>
           <a:p>
@@ -4708,7 +4704,7 @@
           <a:p>
             <a:fld id="{95106318-4FD4-4136-9362-4D516595EC7A}" type="datetime1">
               <a:rPr lang="en-GB" smtClean="0"/>
-              <a:t>17/07/2017</a:t>
+              <a:t>19/07/2017</a:t>
             </a:fld>
             <a:endParaRPr lang="en-GB"/>
           </a:p>
@@ -4863,15 +4859,7 @@
                   <a:srgbClr val="FF99CC"/>
                 </a:solidFill>
               </a:rPr>
-              <a:t>Data </a:t>
-            </a:r>
-            <a:r>
-              <a:rPr lang="pl-PL" b="1" dirty="0" smtClean="0">
-                <a:solidFill>
-                  <a:srgbClr val="FF99CC"/>
-                </a:solidFill>
-              </a:rPr>
-              <a:t>picker:</a:t>
+              <a:t>Data picker:</a:t>
             </a:r>
             <a:r>
               <a:rPr lang="pl-PL" b="1" dirty="0" smtClean="0">
@@ -4928,7 +4916,6 @@
               <a:rPr lang="pl-PL" dirty="0" smtClean="0"/>
               <a:t>Timeline: switches to slideshow mode in which Tracker Maps in a given range will be presented; only png data will be shown in this mode</a:t>
             </a:r>
-            <a:endParaRPr lang="pl-PL" dirty="0" smtClean="0"/>
           </a:p>
           <a:p>
             <a:pPr marL="0" indent="0">
@@ -4955,7 +4942,7 @@
           <a:p>
             <a:fld id="{CF16D5FF-911A-4C3E-9CB6-5A715AA3E49C}" type="datetime1">
               <a:rPr lang="en-GB" smtClean="0"/>
-              <a:t>17/07/2017</a:t>
+              <a:t>19/07/2017</a:t>
             </a:fld>
             <a:endParaRPr lang="en-GB"/>
           </a:p>
@@ -5301,7 +5288,7 @@
           <a:p>
             <a:fld id="{BDB1315C-04B6-4E2D-81A4-8AE0EF989144}" type="datetime1">
               <a:rPr lang="en-GB" smtClean="0"/>
-              <a:t>17/07/2017</a:t>
+              <a:t>19/07/2017</a:t>
             </a:fld>
             <a:endParaRPr lang="en-GB"/>
           </a:p>
@@ -5577,7 +5564,7 @@
           <a:p>
             <a:fld id="{428885FD-27FD-4E64-BF01-054254D78537}" type="datetime1">
               <a:rPr lang="en-GB" smtClean="0"/>
-              <a:t>17/07/2017</a:t>
+              <a:t>19/07/2017</a:t>
             </a:fld>
             <a:endParaRPr lang="en-GB"/>
           </a:p>
@@ -5787,32 +5774,18 @@
               <a:rPr lang="pl-PL" dirty="0" smtClean="0"/>
               <a:t>is changed to Timeline only tabs which present Tracker Maps will be visible (no interactive and text data allowed)</a:t>
             </a:r>
-            <a:endParaRPr lang="pl-PL" dirty="0" smtClean="0"/>
-          </a:p>
-          <a:p>
-            <a:r>
-              <a:rPr lang="pl-PL" dirty="0" smtClean="0"/>
-              <a:t>Tip: if you decide </a:t>
-            </a:r>
-            <a:r>
-              <a:rPr lang="pl-PL" dirty="0" smtClean="0"/>
-              <a:t>that you </a:t>
-            </a:r>
-            <a:r>
-              <a:rPr lang="pl-PL" dirty="0" smtClean="0"/>
-              <a:t>do not want given dataset (map/log) you can either </a:t>
-            </a:r>
-            <a:endParaRPr lang="pl-PL" dirty="0" smtClean="0"/>
+          </a:p>
+          <a:p>
+            <a:r>
+              <a:rPr lang="pl-PL" dirty="0" smtClean="0"/>
+              <a:t>Tip: if you decide that you do not want given dataset (map/log) you can either </a:t>
+            </a:r>
           </a:p>
           <a:p>
             <a:pPr lvl="1"/>
             <a:r>
               <a:rPr lang="pl-PL" dirty="0" smtClean="0"/>
-              <a:t>uncheck </a:t>
-            </a:r>
-            <a:r>
-              <a:rPr lang="pl-PL" dirty="0" smtClean="0"/>
-              <a:t>corresponding checkbox on </a:t>
+              <a:t>uncheck corresponding checkbox on </a:t>
             </a:r>
             <a:r>
               <a:rPr lang="pl-PL" b="1" dirty="0" smtClean="0">
@@ -5826,7 +5799,6 @@
               <a:rPr lang="pl-PL" dirty="0" smtClean="0"/>
               <a:t>or </a:t>
             </a:r>
-            <a:endParaRPr lang="pl-PL" dirty="0" smtClean="0"/>
           </a:p>
           <a:p>
             <a:pPr lvl="1"/>
@@ -5839,11 +5811,7 @@
             <a:pPr lvl="1"/>
             <a:r>
               <a:rPr lang="pl-PL" dirty="0" smtClean="0"/>
-              <a:t>you </a:t>
-            </a:r>
-            <a:r>
-              <a:rPr lang="pl-PL" dirty="0" smtClean="0"/>
-              <a:t>can click </a:t>
+              <a:t>you can click </a:t>
             </a:r>
             <a:r>
               <a:rPr lang="pl-PL" u="sng" dirty="0" smtClean="0"/>
@@ -5851,11 +5819,7 @@
             </a:r>
             <a:r>
               <a:rPr lang="pl-PL" dirty="0" smtClean="0"/>
-              <a:t>to remove </a:t>
-            </a:r>
-            <a:r>
-              <a:rPr lang="pl-PL" dirty="0" smtClean="0"/>
-              <a:t>this tab</a:t>
+              <a:t>to remove this tab</a:t>
             </a:r>
           </a:p>
           <a:p>
@@ -5868,15 +5832,7 @@
             </a:r>
             <a:r>
               <a:rPr lang="pl-PL" dirty="0" smtClean="0"/>
-              <a:t>  Last two options are</a:t>
-            </a:r>
-            <a:r>
-              <a:rPr lang="pl-PL" dirty="0" smtClean="0"/>
-              <a:t> handy </a:t>
-            </a:r>
-            <a:r>
-              <a:rPr lang="pl-PL" dirty="0" smtClean="0"/>
-              <a:t>with hidden </a:t>
+              <a:t>  Last two options are handy with hidden </a:t>
             </a:r>
             <a:r>
               <a:rPr lang="pl-PL" b="1" dirty="0" smtClean="0">
@@ -5911,7 +5867,7 @@
           <a:p>
             <a:fld id="{277B857D-FD6C-4D89-B784-8041C7DA2E7F}" type="datetime1">
               <a:rPr lang="en-GB" smtClean="0"/>
-              <a:t>17/07/2017</a:t>
+              <a:t>19/07/2017</a:t>
             </a:fld>
             <a:endParaRPr lang="en-GB"/>
           </a:p>
@@ -6017,7 +5973,11 @@
           <a:p>
             <a:r>
               <a:rPr lang="pl-PL" dirty="0"/>
-              <a:t>Section 5: </a:t>
+              <a:t>Section </a:t>
+            </a:r>
+            <a:r>
+              <a:rPr lang="pl-PL" dirty="0" smtClean="0"/>
+              <a:t>4: </a:t>
             </a:r>
             <a:r>
               <a:rPr lang="pl-PL" b="1" dirty="0"/>
@@ -6180,7 +6140,7 @@
           <a:p>
             <a:fld id="{48C27299-CEE3-4B8F-837E-F4DBB9C48A7D}" type="datetime1">
               <a:rPr lang="en-GB" smtClean="0"/>
-              <a:t>17/07/2017</a:t>
+              <a:t>19/07/2017</a:t>
             </a:fld>
             <a:endParaRPr lang="en-GB"/>
           </a:p>
@@ -6290,7 +6250,11 @@
             </a:r>
             <a:r>
               <a:rPr lang="pl-PL" dirty="0" smtClean="0"/>
-              <a:t>4A: </a:t>
+              <a:t>5A</a:t>
+            </a:r>
+            <a:r>
+              <a:rPr lang="pl-PL" dirty="0" smtClean="0"/>
+              <a:t>: </a:t>
             </a:r>
             <a:r>
               <a:rPr lang="pl-PL" b="1" dirty="0" smtClean="0">
@@ -6298,15 +6262,7 @@
                   <a:schemeClr val="accent6"/>
                 </a:solidFill>
               </a:rPr>
-              <a:t>Data </a:t>
-            </a:r>
-            <a:r>
-              <a:rPr lang="pl-PL" b="1" dirty="0" smtClean="0">
-                <a:solidFill>
-                  <a:schemeClr val="accent6"/>
-                </a:solidFill>
-              </a:rPr>
-              <a:t>Show: Comparison</a:t>
+              <a:t>Data Show: Comparison</a:t>
             </a:r>
             <a:endParaRPr lang="en-GB" b="1" dirty="0">
               <a:solidFill>
@@ -6360,15 +6316,7 @@
             <a:pPr lvl="1"/>
             <a:r>
               <a:rPr lang="pl-PL" dirty="0" smtClean="0"/>
-              <a:t>Images: they allow for panning(dragging) </a:t>
-            </a:r>
-            <a:r>
-              <a:rPr lang="pl-PL" dirty="0" smtClean="0"/>
-              <a:t>&amp; </a:t>
-            </a:r>
-            <a:r>
-              <a:rPr lang="pl-PL" dirty="0" smtClean="0"/>
-              <a:t>zooming with your </a:t>
+              <a:t>Images: they allow for panning(dragging) &amp; zooming with your </a:t>
             </a:r>
             <a:r>
               <a:rPr lang="pl-PL" u="sng" dirty="0" smtClean="0"/>
@@ -6424,7 +6372,7 @@
           <a:p>
             <a:fld id="{8B1429E9-75C2-4D2C-B8E9-FF6F8808264A}" type="datetime1">
               <a:rPr lang="en-GB" smtClean="0"/>
-              <a:t>17/07/2017</a:t>
+              <a:t>19/07/2017</a:t>
             </a:fld>
             <a:endParaRPr lang="en-GB"/>
           </a:p>
@@ -6530,7 +6478,11 @@
           <a:p>
             <a:r>
               <a:rPr lang="pl-PL" dirty="0"/>
-              <a:t>Section 4: </a:t>
+              <a:t>Section </a:t>
+            </a:r>
+            <a:r>
+              <a:rPr lang="pl-PL" dirty="0" smtClean="0"/>
+              <a:t>5A: </a:t>
             </a:r>
             <a:r>
               <a:rPr lang="pl-PL" b="1" dirty="0">
@@ -6698,7 +6650,7 @@
           <a:p>
             <a:fld id="{30CCC893-4F25-4336-82DA-7472B157839F}" type="datetime1">
               <a:rPr lang="en-GB" smtClean="0"/>
-              <a:t>17/07/2017</a:t>
+              <a:t>19/07/2017</a:t>
             </a:fld>
             <a:endParaRPr lang="en-GB"/>
           </a:p>

</xml_diff>